<commit_message>
review after first submission to James
</commit_message>
<xml_diff>
--- a/Indicator Availability for RC Countries.pptx
+++ b/Indicator Availability for RC Countries.pptx
@@ -7,9 +7,23 @@
   <p:sldIdLst>
     <p:sldId id="261" r:id="rId2"/>
     <p:sldId id="258" r:id="rId3"/>
-    <p:sldId id="259" r:id="rId4"/>
-    <p:sldId id="260" r:id="rId5"/>
-    <p:sldId id="256" r:id="rId6"/>
+    <p:sldId id="262" r:id="rId4"/>
+    <p:sldId id="269" r:id="rId5"/>
+    <p:sldId id="270" r:id="rId6"/>
+    <p:sldId id="271" r:id="rId7"/>
+    <p:sldId id="272" r:id="rId8"/>
+    <p:sldId id="273" r:id="rId9"/>
+    <p:sldId id="274" r:id="rId10"/>
+    <p:sldId id="264" r:id="rId11"/>
+    <p:sldId id="265" r:id="rId12"/>
+    <p:sldId id="266" r:id="rId13"/>
+    <p:sldId id="267" r:id="rId14"/>
+    <p:sldId id="275" r:id="rId15"/>
+    <p:sldId id="276" r:id="rId16"/>
+    <p:sldId id="277" r:id="rId17"/>
+    <p:sldId id="278" r:id="rId18"/>
+    <p:sldId id="268" r:id="rId19"/>
+    <p:sldId id="256" r:id="rId20"/>
   </p:sldIdLst>
   <p:sldSz cx="12192000" cy="6858000"/>
   <p:notesSz cx="6858000" cy="9144000"/>
@@ -119,8 +133,7 @@
 <file path=ppt/revisionInfo.xml><?xml version="1.0" encoding="utf-8"?>
 <p1510:revInfo xmlns:a="http://schemas.openxmlformats.org/drawingml/2006/main" xmlns:r="http://schemas.openxmlformats.org/officeDocument/2006/relationships" xmlns:p1510="http://schemas.microsoft.com/office/powerpoint/2015/10/main">
   <p1510:revLst>
-    <p1510:client id="{D70A9BF6-812D-4712-A039-9551B7EAC921}" v="97" dt="2019-03-08T10:53:53.579"/>
-    <p1510:client id="{AB4C863E-6534-4148-8626-462F371F3E9A}" v="60" dt="2019-03-08T12:42:22.628"/>
+    <p1510:client id="{AB4C863E-6534-4148-8626-462F371F3E9A}" v="229" dt="2019-03-11T16:31:55.788"/>
   </p1510:revLst>
 </p1510:revInfo>
 </file>
@@ -129,8 +142,8 @@
 <pc:chgInfo xmlns:a="http://schemas.openxmlformats.org/drawingml/2006/main" xmlns:r="http://schemas.openxmlformats.org/officeDocument/2006/relationships" xmlns:ac="http://schemas.microsoft.com/office/drawing/2013/main/command" xmlns:pc="http://schemas.microsoft.com/office/powerpoint/2013/main/command">
   <pc:docChgLst>
     <pc:chgData name="Luis Gerardo Gonzalez Morales" userId="6859254f-0ec3-4a5d-9eb4-550f76695e6d" providerId="ADAL" clId="{AB4C863E-6534-4148-8626-462F371F3E9A}"/>
-    <pc:docChg chg="undo modSld">
-      <pc:chgData name="Luis Gerardo Gonzalez Morales" userId="6859254f-0ec3-4a5d-9eb4-550f76695e6d" providerId="ADAL" clId="{AB4C863E-6534-4148-8626-462F371F3E9A}" dt="2019-03-08T12:42:22.628" v="59" actId="1076"/>
+    <pc:docChg chg="undo custSel addSld delSld modSld">
+      <pc:chgData name="Luis Gerardo Gonzalez Morales" userId="6859254f-0ec3-4a5d-9eb4-550f76695e6d" providerId="ADAL" clId="{AB4C863E-6534-4148-8626-462F371F3E9A}" dt="2019-03-11T16:31:55.788" v="228" actId="1076"/>
       <pc:docMkLst>
         <pc:docMk/>
       </pc:docMkLst>
@@ -164,30 +177,38 @@
           </ac:graphicFrameMkLst>
         </pc:graphicFrameChg>
       </pc:sldChg>
-      <pc:sldChg chg="addSp modSp">
-        <pc:chgData name="Luis Gerardo Gonzalez Morales" userId="6859254f-0ec3-4a5d-9eb4-550f76695e6d" providerId="ADAL" clId="{AB4C863E-6534-4148-8626-462F371F3E9A}" dt="2019-03-08T12:42:11.886" v="57" actId="208"/>
+      <pc:sldChg chg="addSp delSp modSp del">
+        <pc:chgData name="Luis Gerardo Gonzalez Morales" userId="6859254f-0ec3-4a5d-9eb4-550f76695e6d" providerId="ADAL" clId="{AB4C863E-6534-4148-8626-462F371F3E9A}" dt="2019-03-11T15:43:00.622" v="86" actId="2696"/>
         <pc:sldMkLst>
           <pc:docMk/>
           <pc:sldMk cId="3716473134" sldId="259"/>
         </pc:sldMkLst>
-        <pc:spChg chg="add mod">
-          <ac:chgData name="Luis Gerardo Gonzalez Morales" userId="6859254f-0ec3-4a5d-9eb4-550f76695e6d" providerId="ADAL" clId="{AB4C863E-6534-4148-8626-462F371F3E9A}" dt="2019-03-08T12:42:05.913" v="56" actId="1076"/>
+        <pc:spChg chg="add del mod">
+          <ac:chgData name="Luis Gerardo Gonzalez Morales" userId="6859254f-0ec3-4a5d-9eb4-550f76695e6d" providerId="ADAL" clId="{AB4C863E-6534-4148-8626-462F371F3E9A}" dt="2019-03-11T15:34:12.501" v="66" actId="478"/>
           <ac:spMkLst>
             <pc:docMk/>
             <pc:sldMk cId="3716473134" sldId="259"/>
             <ac:spMk id="4" creationId="{68C77C27-C6F3-413A-97E6-33DE9B81A442}"/>
           </ac:spMkLst>
         </pc:spChg>
-        <pc:picChg chg="mod">
-          <ac:chgData name="Luis Gerardo Gonzalez Morales" userId="6859254f-0ec3-4a5d-9eb4-550f76695e6d" providerId="ADAL" clId="{AB4C863E-6534-4148-8626-462F371F3E9A}" dt="2019-03-08T12:42:02.076" v="55" actId="1076"/>
+        <pc:picChg chg="del mod">
+          <ac:chgData name="Luis Gerardo Gonzalez Morales" userId="6859254f-0ec3-4a5d-9eb4-550f76695e6d" providerId="ADAL" clId="{AB4C863E-6534-4148-8626-462F371F3E9A}" dt="2019-03-11T15:33:22.386" v="60" actId="478"/>
           <ac:picMkLst>
             <pc:docMk/>
             <pc:sldMk cId="3716473134" sldId="259"/>
             <ac:picMk id="3" creationId="{2F9A36B5-9C50-4C83-830E-7367DE0562FA}"/>
           </ac:picMkLst>
         </pc:picChg>
-        <pc:cxnChg chg="add mod">
-          <ac:chgData name="Luis Gerardo Gonzalez Morales" userId="6859254f-0ec3-4a5d-9eb4-550f76695e6d" providerId="ADAL" clId="{AB4C863E-6534-4148-8626-462F371F3E9A}" dt="2019-03-08T12:42:11.886" v="57" actId="208"/>
+        <pc:picChg chg="add mod">
+          <ac:chgData name="Luis Gerardo Gonzalez Morales" userId="6859254f-0ec3-4a5d-9eb4-550f76695e6d" providerId="ADAL" clId="{AB4C863E-6534-4148-8626-462F371F3E9A}" dt="2019-03-11T15:36:11.124" v="84" actId="1076"/>
+          <ac:picMkLst>
+            <pc:docMk/>
+            <pc:sldMk cId="3716473134" sldId="259"/>
+            <ac:picMk id="7" creationId="{87DC69D3-C542-4B75-86FE-4241BE95F1C6}"/>
+          </ac:picMkLst>
+        </pc:picChg>
+        <pc:cxnChg chg="add del mod">
+          <ac:chgData name="Luis Gerardo Gonzalez Morales" userId="6859254f-0ec3-4a5d-9eb4-550f76695e6d" providerId="ADAL" clId="{AB4C863E-6534-4148-8626-462F371F3E9A}" dt="2019-03-11T15:34:14.532" v="67" actId="478"/>
           <ac:cxnSpMkLst>
             <pc:docMk/>
             <pc:sldMk cId="3716473134" sldId="259"/>
@@ -195,36 +216,315 @@
           </ac:cxnSpMkLst>
         </pc:cxnChg>
       </pc:sldChg>
-      <pc:sldChg chg="addSp modSp">
-        <pc:chgData name="Luis Gerardo Gonzalez Morales" userId="6859254f-0ec3-4a5d-9eb4-550f76695e6d" providerId="ADAL" clId="{AB4C863E-6534-4148-8626-462F371F3E9A}" dt="2019-03-08T12:42:22.628" v="59" actId="1076"/>
+      <pc:sldChg chg="addSp delSp modSp del">
+        <pc:chgData name="Luis Gerardo Gonzalez Morales" userId="6859254f-0ec3-4a5d-9eb4-550f76695e6d" providerId="ADAL" clId="{AB4C863E-6534-4148-8626-462F371F3E9A}" dt="2019-03-11T15:54:46.563" v="126" actId="2696"/>
         <pc:sldMkLst>
           <pc:docMk/>
           <pc:sldMk cId="1674515983" sldId="260"/>
         </pc:sldMkLst>
-        <pc:spChg chg="add">
-          <ac:chgData name="Luis Gerardo Gonzalez Morales" userId="6859254f-0ec3-4a5d-9eb4-550f76695e6d" providerId="ADAL" clId="{AB4C863E-6534-4148-8626-462F371F3E9A}" dt="2019-03-08T12:42:20.730" v="58"/>
+        <pc:spChg chg="add del">
+          <ac:chgData name="Luis Gerardo Gonzalez Morales" userId="6859254f-0ec3-4a5d-9eb4-550f76695e6d" providerId="ADAL" clId="{AB4C863E-6534-4148-8626-462F371F3E9A}" dt="2019-03-11T15:35:02.913" v="70" actId="478"/>
           <ac:spMkLst>
             <pc:docMk/>
             <pc:sldMk cId="1674515983" sldId="260"/>
             <ac:spMk id="5" creationId="{C744D768-E425-4B20-BB2A-3CB548FE1332}"/>
           </ac:spMkLst>
         </pc:spChg>
-        <pc:picChg chg="mod">
-          <ac:chgData name="Luis Gerardo Gonzalez Morales" userId="6859254f-0ec3-4a5d-9eb4-550f76695e6d" providerId="ADAL" clId="{AB4C863E-6534-4148-8626-462F371F3E9A}" dt="2019-03-08T12:42:22.628" v="59" actId="1076"/>
+        <pc:picChg chg="del mod">
+          <ac:chgData name="Luis Gerardo Gonzalez Morales" userId="6859254f-0ec3-4a5d-9eb4-550f76695e6d" providerId="ADAL" clId="{AB4C863E-6534-4148-8626-462F371F3E9A}" dt="2019-03-11T15:33:25.457" v="61" actId="478"/>
           <ac:picMkLst>
             <pc:docMk/>
             <pc:sldMk cId="1674515983" sldId="260"/>
             <ac:picMk id="3" creationId="{625AF3CE-3539-4DE7-A4A7-AFF18F9CDCB7}"/>
           </ac:picMkLst>
         </pc:picChg>
-        <pc:cxnChg chg="add">
-          <ac:chgData name="Luis Gerardo Gonzalez Morales" userId="6859254f-0ec3-4a5d-9eb4-550f76695e6d" providerId="ADAL" clId="{AB4C863E-6534-4148-8626-462F371F3E9A}" dt="2019-03-08T12:42:20.730" v="58"/>
+        <pc:picChg chg="add del mod">
+          <ac:chgData name="Luis Gerardo Gonzalez Morales" userId="6859254f-0ec3-4a5d-9eb4-550f76695e6d" providerId="ADAL" clId="{AB4C863E-6534-4148-8626-462F371F3E9A}" dt="2019-03-11T15:42:58.249" v="85" actId="478"/>
+          <ac:picMkLst>
+            <pc:docMk/>
+            <pc:sldMk cId="1674515983" sldId="260"/>
+            <ac:picMk id="7" creationId="{1AFACCC4-263D-439C-89D9-CFB7567D6CF8}"/>
+          </ac:picMkLst>
+        </pc:picChg>
+        <pc:picChg chg="add mod">
+          <ac:chgData name="Luis Gerardo Gonzalez Morales" userId="6859254f-0ec3-4a5d-9eb4-550f76695e6d" providerId="ADAL" clId="{AB4C863E-6534-4148-8626-462F371F3E9A}" dt="2019-03-11T15:45:22.697" v="96" actId="1076"/>
+          <ac:picMkLst>
+            <pc:docMk/>
+            <pc:sldMk cId="1674515983" sldId="260"/>
+            <ac:picMk id="9" creationId="{51052CC3-10EE-4E84-A360-152123F24E33}"/>
+          </ac:picMkLst>
+        </pc:picChg>
+        <pc:cxnChg chg="add del">
+          <ac:chgData name="Luis Gerardo Gonzalez Morales" userId="6859254f-0ec3-4a5d-9eb4-550f76695e6d" providerId="ADAL" clId="{AB4C863E-6534-4148-8626-462F371F3E9A}" dt="2019-03-11T15:35:03.639" v="71" actId="478"/>
           <ac:cxnSpMkLst>
             <pc:docMk/>
             <pc:sldMk cId="1674515983" sldId="260"/>
             <ac:cxnSpMk id="6" creationId="{3A9C3E48-25A9-4F16-A9B7-45CBF7CA86BD}"/>
           </ac:cxnSpMkLst>
         </pc:cxnChg>
+      </pc:sldChg>
+      <pc:sldChg chg="addSp delSp modSp add">
+        <pc:chgData name="Luis Gerardo Gonzalez Morales" userId="6859254f-0ec3-4a5d-9eb4-550f76695e6d" providerId="ADAL" clId="{AB4C863E-6534-4148-8626-462F371F3E9A}" dt="2019-03-11T15:55:15.336" v="138" actId="1076"/>
+        <pc:sldMkLst>
+          <pc:docMk/>
+          <pc:sldMk cId="2419076774" sldId="262"/>
+        </pc:sldMkLst>
+        <pc:picChg chg="add del mod">
+          <ac:chgData name="Luis Gerardo Gonzalez Morales" userId="6859254f-0ec3-4a5d-9eb4-550f76695e6d" providerId="ADAL" clId="{AB4C863E-6534-4148-8626-462F371F3E9A}" dt="2019-03-11T15:54:45.453" v="125" actId="478"/>
+          <ac:picMkLst>
+            <pc:docMk/>
+            <pc:sldMk cId="2419076774" sldId="262"/>
+            <ac:picMk id="4" creationId="{CDAEA69E-A322-40CC-BFC8-E6D23FCDD467}"/>
+          </ac:picMkLst>
+        </pc:picChg>
+        <pc:picChg chg="add mod">
+          <ac:chgData name="Luis Gerardo Gonzalez Morales" userId="6859254f-0ec3-4a5d-9eb4-550f76695e6d" providerId="ADAL" clId="{AB4C863E-6534-4148-8626-462F371F3E9A}" dt="2019-03-11T15:55:15.336" v="138" actId="1076"/>
+          <ac:picMkLst>
+            <pc:docMk/>
+            <pc:sldMk cId="2419076774" sldId="262"/>
+            <ac:picMk id="6" creationId="{3F64F720-5F6C-47BC-A27E-BA46F684A253}"/>
+          </ac:picMkLst>
+        </pc:picChg>
+      </pc:sldChg>
+      <pc:sldChg chg="addSp modSp add del">
+        <pc:chgData name="Luis Gerardo Gonzalez Morales" userId="6859254f-0ec3-4a5d-9eb4-550f76695e6d" providerId="ADAL" clId="{AB4C863E-6534-4148-8626-462F371F3E9A}" dt="2019-03-11T15:54:41.719" v="123" actId="2696"/>
+        <pc:sldMkLst>
+          <pc:docMk/>
+          <pc:sldMk cId="663894965" sldId="263"/>
+        </pc:sldMkLst>
+        <pc:picChg chg="add mod">
+          <ac:chgData name="Luis Gerardo Gonzalez Morales" userId="6859254f-0ec3-4a5d-9eb4-550f76695e6d" providerId="ADAL" clId="{AB4C863E-6534-4148-8626-462F371F3E9A}" dt="2019-03-11T15:47:10.461" v="108" actId="1076"/>
+          <ac:picMkLst>
+            <pc:docMk/>
+            <pc:sldMk cId="663894965" sldId="263"/>
+            <ac:picMk id="4" creationId="{10406A9F-0080-49EB-AA2E-314EA269286F}"/>
+          </ac:picMkLst>
+        </pc:picChg>
+      </pc:sldChg>
+      <pc:sldChg chg="addSp delSp modSp add">
+        <pc:chgData name="Luis Gerardo Gonzalez Morales" userId="6859254f-0ec3-4a5d-9eb4-550f76695e6d" providerId="ADAL" clId="{AB4C863E-6534-4148-8626-462F371F3E9A}" dt="2019-03-11T16:16:52.624" v="186" actId="1076"/>
+        <pc:sldMkLst>
+          <pc:docMk/>
+          <pc:sldMk cId="4204560451" sldId="264"/>
+        </pc:sldMkLst>
+        <pc:picChg chg="add del mod">
+          <ac:chgData name="Luis Gerardo Gonzalez Morales" userId="6859254f-0ec3-4a5d-9eb4-550f76695e6d" providerId="ADAL" clId="{AB4C863E-6534-4148-8626-462F371F3E9A}" dt="2019-03-11T15:48:41.181" v="115" actId="478"/>
+          <ac:picMkLst>
+            <pc:docMk/>
+            <pc:sldMk cId="4204560451" sldId="264"/>
+            <ac:picMk id="4" creationId="{6B7C87C5-B1A8-42E2-AA43-C35371EAE2F7}"/>
+          </ac:picMkLst>
+        </pc:picChg>
+        <pc:picChg chg="add del mod">
+          <ac:chgData name="Luis Gerardo Gonzalez Morales" userId="6859254f-0ec3-4a5d-9eb4-550f76695e6d" providerId="ADAL" clId="{AB4C863E-6534-4148-8626-462F371F3E9A}" dt="2019-03-11T15:54:44.036" v="124" actId="478"/>
+          <ac:picMkLst>
+            <pc:docMk/>
+            <pc:sldMk cId="4204560451" sldId="264"/>
+            <ac:picMk id="6" creationId="{F86F9DD4-9AB9-4D4F-BDD8-6F1235207E25}"/>
+          </ac:picMkLst>
+        </pc:picChg>
+        <pc:picChg chg="add mod">
+          <ac:chgData name="Luis Gerardo Gonzalez Morales" userId="6859254f-0ec3-4a5d-9eb4-550f76695e6d" providerId="ADAL" clId="{AB4C863E-6534-4148-8626-462F371F3E9A}" dt="2019-03-11T16:16:52.624" v="186" actId="1076"/>
+          <ac:picMkLst>
+            <pc:docMk/>
+            <pc:sldMk cId="4204560451" sldId="264"/>
+            <ac:picMk id="8" creationId="{DFE941FD-B945-4090-BDAC-E63CF124034A}"/>
+          </ac:picMkLst>
+        </pc:picChg>
+      </pc:sldChg>
+      <pc:sldChg chg="addSp modSp add">
+        <pc:chgData name="Luis Gerardo Gonzalez Morales" userId="6859254f-0ec3-4a5d-9eb4-550f76695e6d" providerId="ADAL" clId="{AB4C863E-6534-4148-8626-462F371F3E9A}" dt="2019-03-11T16:17:53.950" v="192" actId="1076"/>
+        <pc:sldMkLst>
+          <pc:docMk/>
+          <pc:sldMk cId="1905659334" sldId="265"/>
+        </pc:sldMkLst>
+        <pc:picChg chg="add mod">
+          <ac:chgData name="Luis Gerardo Gonzalez Morales" userId="6859254f-0ec3-4a5d-9eb4-550f76695e6d" providerId="ADAL" clId="{AB4C863E-6534-4148-8626-462F371F3E9A}" dt="2019-03-11T16:17:53.950" v="192" actId="1076"/>
+          <ac:picMkLst>
+            <pc:docMk/>
+            <pc:sldMk cId="1905659334" sldId="265"/>
+            <ac:picMk id="4" creationId="{E90753FB-12AA-4491-ABDE-8D878AE9682E}"/>
+          </ac:picMkLst>
+        </pc:picChg>
+      </pc:sldChg>
+      <pc:sldChg chg="addSp modSp add">
+        <pc:chgData name="Luis Gerardo Gonzalez Morales" userId="6859254f-0ec3-4a5d-9eb4-550f76695e6d" providerId="ADAL" clId="{AB4C863E-6534-4148-8626-462F371F3E9A}" dt="2019-03-11T16:18:43.325" v="198" actId="1076"/>
+        <pc:sldMkLst>
+          <pc:docMk/>
+          <pc:sldMk cId="461336054" sldId="266"/>
+        </pc:sldMkLst>
+        <pc:picChg chg="add mod">
+          <ac:chgData name="Luis Gerardo Gonzalez Morales" userId="6859254f-0ec3-4a5d-9eb4-550f76695e6d" providerId="ADAL" clId="{AB4C863E-6534-4148-8626-462F371F3E9A}" dt="2019-03-11T16:18:43.325" v="198" actId="1076"/>
+          <ac:picMkLst>
+            <pc:docMk/>
+            <pc:sldMk cId="461336054" sldId="266"/>
+            <ac:picMk id="4" creationId="{5ECCEF79-FE8D-48FD-8F62-2BCEF2D45935}"/>
+          </ac:picMkLst>
+        </pc:picChg>
+      </pc:sldChg>
+      <pc:sldChg chg="addSp modSp add">
+        <pc:chgData name="Luis Gerardo Gonzalez Morales" userId="6859254f-0ec3-4a5d-9eb4-550f76695e6d" providerId="ADAL" clId="{AB4C863E-6534-4148-8626-462F371F3E9A}" dt="2019-03-11T16:20:22.727" v="209" actId="1076"/>
+        <pc:sldMkLst>
+          <pc:docMk/>
+          <pc:sldMk cId="3017265368" sldId="267"/>
+        </pc:sldMkLst>
+        <pc:picChg chg="add mod">
+          <ac:chgData name="Luis Gerardo Gonzalez Morales" userId="6859254f-0ec3-4a5d-9eb4-550f76695e6d" providerId="ADAL" clId="{AB4C863E-6534-4148-8626-462F371F3E9A}" dt="2019-03-11T16:20:22.727" v="209" actId="1076"/>
+          <ac:picMkLst>
+            <pc:docMk/>
+            <pc:sldMk cId="3017265368" sldId="267"/>
+            <ac:picMk id="4" creationId="{334CD17A-78CC-4B70-B1B1-8DF529BF4E41}"/>
+          </ac:picMkLst>
+        </pc:picChg>
+      </pc:sldChg>
+      <pc:sldChg chg="add">
+        <pc:chgData name="Luis Gerardo Gonzalez Morales" userId="6859254f-0ec3-4a5d-9eb4-550f76695e6d" providerId="ADAL" clId="{AB4C863E-6534-4148-8626-462F371F3E9A}" dt="2019-03-11T15:35:12.340" v="78"/>
+        <pc:sldMkLst>
+          <pc:docMk/>
+          <pc:sldMk cId="2213640062" sldId="268"/>
+        </pc:sldMkLst>
+      </pc:sldChg>
+      <pc:sldChg chg="addSp modSp add">
+        <pc:chgData name="Luis Gerardo Gonzalez Morales" userId="6859254f-0ec3-4a5d-9eb4-550f76695e6d" providerId="ADAL" clId="{AB4C863E-6534-4148-8626-462F371F3E9A}" dt="2019-03-11T15:55:48.457" v="144" actId="1076"/>
+        <pc:sldMkLst>
+          <pc:docMk/>
+          <pc:sldMk cId="2649136025" sldId="269"/>
+        </pc:sldMkLst>
+        <pc:picChg chg="add mod">
+          <ac:chgData name="Luis Gerardo Gonzalez Morales" userId="6859254f-0ec3-4a5d-9eb4-550f76695e6d" providerId="ADAL" clId="{AB4C863E-6534-4148-8626-462F371F3E9A}" dt="2019-03-11T15:55:48.457" v="144" actId="1076"/>
+          <ac:picMkLst>
+            <pc:docMk/>
+            <pc:sldMk cId="2649136025" sldId="269"/>
+            <ac:picMk id="4" creationId="{0E7F7D4D-9735-439C-91EB-129A6AC90039}"/>
+          </ac:picMkLst>
+        </pc:picChg>
+      </pc:sldChg>
+      <pc:sldChg chg="addSp modSp add">
+        <pc:chgData name="Luis Gerardo Gonzalez Morales" userId="6859254f-0ec3-4a5d-9eb4-550f76695e6d" providerId="ADAL" clId="{AB4C863E-6534-4148-8626-462F371F3E9A}" dt="2019-03-11T15:56:16.020" v="150" actId="1076"/>
+        <pc:sldMkLst>
+          <pc:docMk/>
+          <pc:sldMk cId="3511115641" sldId="270"/>
+        </pc:sldMkLst>
+        <pc:picChg chg="add mod">
+          <ac:chgData name="Luis Gerardo Gonzalez Morales" userId="6859254f-0ec3-4a5d-9eb4-550f76695e6d" providerId="ADAL" clId="{AB4C863E-6534-4148-8626-462F371F3E9A}" dt="2019-03-11T15:56:16.020" v="150" actId="1076"/>
+          <ac:picMkLst>
+            <pc:docMk/>
+            <pc:sldMk cId="3511115641" sldId="270"/>
+            <ac:picMk id="4" creationId="{D71B252D-714B-46D3-94A9-450F1D7FBE08}"/>
+          </ac:picMkLst>
+        </pc:picChg>
+      </pc:sldChg>
+      <pc:sldChg chg="addSp modSp add">
+        <pc:chgData name="Luis Gerardo Gonzalez Morales" userId="6859254f-0ec3-4a5d-9eb4-550f76695e6d" providerId="ADAL" clId="{AB4C863E-6534-4148-8626-462F371F3E9A}" dt="2019-03-11T15:57:05.271" v="157" actId="1076"/>
+        <pc:sldMkLst>
+          <pc:docMk/>
+          <pc:sldMk cId="1877921158" sldId="271"/>
+        </pc:sldMkLst>
+        <pc:picChg chg="add mod">
+          <ac:chgData name="Luis Gerardo Gonzalez Morales" userId="6859254f-0ec3-4a5d-9eb4-550f76695e6d" providerId="ADAL" clId="{AB4C863E-6534-4148-8626-462F371F3E9A}" dt="2019-03-11T15:57:05.271" v="157" actId="1076"/>
+          <ac:picMkLst>
+            <pc:docMk/>
+            <pc:sldMk cId="1877921158" sldId="271"/>
+            <ac:picMk id="4" creationId="{4EB0E8E5-71F4-400F-BF76-0D3E2803F08B}"/>
+          </ac:picMkLst>
+        </pc:picChg>
+      </pc:sldChg>
+      <pc:sldChg chg="addSp modSp add">
+        <pc:chgData name="Luis Gerardo Gonzalez Morales" userId="6859254f-0ec3-4a5d-9eb4-550f76695e6d" providerId="ADAL" clId="{AB4C863E-6534-4148-8626-462F371F3E9A}" dt="2019-03-11T15:57:56.922" v="165" actId="1076"/>
+        <pc:sldMkLst>
+          <pc:docMk/>
+          <pc:sldMk cId="1405631737" sldId="272"/>
+        </pc:sldMkLst>
+        <pc:picChg chg="add mod">
+          <ac:chgData name="Luis Gerardo Gonzalez Morales" userId="6859254f-0ec3-4a5d-9eb4-550f76695e6d" providerId="ADAL" clId="{AB4C863E-6534-4148-8626-462F371F3E9A}" dt="2019-03-11T15:57:56.922" v="165" actId="1076"/>
+          <ac:picMkLst>
+            <pc:docMk/>
+            <pc:sldMk cId="1405631737" sldId="272"/>
+            <ac:picMk id="4" creationId="{DF3CFB0A-3902-46B1-A8B3-EB96F6965AE2}"/>
+          </ac:picMkLst>
+        </pc:picChg>
+      </pc:sldChg>
+      <pc:sldChg chg="addSp modSp add">
+        <pc:chgData name="Luis Gerardo Gonzalez Morales" userId="6859254f-0ec3-4a5d-9eb4-550f76695e6d" providerId="ADAL" clId="{AB4C863E-6534-4148-8626-462F371F3E9A}" dt="2019-03-11T15:58:32.122" v="171" actId="1076"/>
+        <pc:sldMkLst>
+          <pc:docMk/>
+          <pc:sldMk cId="471415155" sldId="273"/>
+        </pc:sldMkLst>
+        <pc:picChg chg="add mod">
+          <ac:chgData name="Luis Gerardo Gonzalez Morales" userId="6859254f-0ec3-4a5d-9eb4-550f76695e6d" providerId="ADAL" clId="{AB4C863E-6534-4148-8626-462F371F3E9A}" dt="2019-03-11T15:58:32.122" v="171" actId="1076"/>
+          <ac:picMkLst>
+            <pc:docMk/>
+            <pc:sldMk cId="471415155" sldId="273"/>
+            <ac:picMk id="4" creationId="{6B3DE265-E987-4709-A7FC-1DF8930C702A}"/>
+          </ac:picMkLst>
+        </pc:picChg>
+      </pc:sldChg>
+      <pc:sldChg chg="addSp modSp add">
+        <pc:chgData name="Luis Gerardo Gonzalez Morales" userId="6859254f-0ec3-4a5d-9eb4-550f76695e6d" providerId="ADAL" clId="{AB4C863E-6534-4148-8626-462F371F3E9A}" dt="2019-03-11T16:15:48.920" v="180" actId="1076"/>
+        <pc:sldMkLst>
+          <pc:docMk/>
+          <pc:sldMk cId="3535226098" sldId="274"/>
+        </pc:sldMkLst>
+        <pc:picChg chg="add mod">
+          <ac:chgData name="Luis Gerardo Gonzalez Morales" userId="6859254f-0ec3-4a5d-9eb4-550f76695e6d" providerId="ADAL" clId="{AB4C863E-6534-4148-8626-462F371F3E9A}" dt="2019-03-11T16:15:48.920" v="180" actId="1076"/>
+          <ac:picMkLst>
+            <pc:docMk/>
+            <pc:sldMk cId="3535226098" sldId="274"/>
+            <ac:picMk id="4" creationId="{F1CB1F44-68F5-4D03-A621-F253B2E1B353}"/>
+          </ac:picMkLst>
+        </pc:picChg>
+      </pc:sldChg>
+      <pc:sldChg chg="addSp modSp add">
+        <pc:chgData name="Luis Gerardo Gonzalez Morales" userId="6859254f-0ec3-4a5d-9eb4-550f76695e6d" providerId="ADAL" clId="{AB4C863E-6534-4148-8626-462F371F3E9A}" dt="2019-03-11T16:21:06.594" v="216" actId="1076"/>
+        <pc:sldMkLst>
+          <pc:docMk/>
+          <pc:sldMk cId="4224875666" sldId="275"/>
+        </pc:sldMkLst>
+        <pc:picChg chg="add mod">
+          <ac:chgData name="Luis Gerardo Gonzalez Morales" userId="6859254f-0ec3-4a5d-9eb4-550f76695e6d" providerId="ADAL" clId="{AB4C863E-6534-4148-8626-462F371F3E9A}" dt="2019-03-11T16:21:06.594" v="216" actId="1076"/>
+          <ac:picMkLst>
+            <pc:docMk/>
+            <pc:sldMk cId="4224875666" sldId="275"/>
+            <ac:picMk id="4" creationId="{354B1AEE-C0C2-4232-94C9-28ADC80811D2}"/>
+          </ac:picMkLst>
+        </pc:picChg>
+      </pc:sldChg>
+      <pc:sldChg chg="addSp modSp add">
+        <pc:chgData name="Luis Gerardo Gonzalez Morales" userId="6859254f-0ec3-4a5d-9eb4-550f76695e6d" providerId="ADAL" clId="{AB4C863E-6534-4148-8626-462F371F3E9A}" dt="2019-03-11T16:30:28.985" v="222" actId="1076"/>
+        <pc:sldMkLst>
+          <pc:docMk/>
+          <pc:sldMk cId="4141030355" sldId="276"/>
+        </pc:sldMkLst>
+        <pc:picChg chg="add mod">
+          <ac:chgData name="Luis Gerardo Gonzalez Morales" userId="6859254f-0ec3-4a5d-9eb4-550f76695e6d" providerId="ADAL" clId="{AB4C863E-6534-4148-8626-462F371F3E9A}" dt="2019-03-11T16:30:28.985" v="222" actId="1076"/>
+          <ac:picMkLst>
+            <pc:docMk/>
+            <pc:sldMk cId="4141030355" sldId="276"/>
+            <ac:picMk id="4" creationId="{8E2EA37D-482A-4F5E-8875-1D8E9FCB0651}"/>
+          </ac:picMkLst>
+        </pc:picChg>
+      </pc:sldChg>
+      <pc:sldChg chg="addSp modSp add">
+        <pc:chgData name="Luis Gerardo Gonzalez Morales" userId="6859254f-0ec3-4a5d-9eb4-550f76695e6d" providerId="ADAL" clId="{AB4C863E-6534-4148-8626-462F371F3E9A}" dt="2019-03-11T16:31:55.788" v="228" actId="1076"/>
+        <pc:sldMkLst>
+          <pc:docMk/>
+          <pc:sldMk cId="3275887000" sldId="277"/>
+        </pc:sldMkLst>
+        <pc:picChg chg="add mod">
+          <ac:chgData name="Luis Gerardo Gonzalez Morales" userId="6859254f-0ec3-4a5d-9eb4-550f76695e6d" providerId="ADAL" clId="{AB4C863E-6534-4148-8626-462F371F3E9A}" dt="2019-03-11T16:31:55.788" v="228" actId="1076"/>
+          <ac:picMkLst>
+            <pc:docMk/>
+            <pc:sldMk cId="3275887000" sldId="277"/>
+            <ac:picMk id="4" creationId="{AC6AA9FD-5EE1-489B-97BD-6552CC2F3B31}"/>
+          </ac:picMkLst>
+        </pc:picChg>
+      </pc:sldChg>
+      <pc:sldChg chg="add">
+        <pc:chgData name="Luis Gerardo Gonzalez Morales" userId="6859254f-0ec3-4a5d-9eb4-550f76695e6d" providerId="ADAL" clId="{AB4C863E-6534-4148-8626-462F371F3E9A}" dt="2019-03-11T16:19:19.826" v="202"/>
+        <pc:sldMkLst>
+          <pc:docMk/>
+          <pc:sldMk cId="1904156910" sldId="278"/>
+        </pc:sldMkLst>
       </pc:sldChg>
     </pc:docChg>
   </pc:docChgLst>
@@ -1767,7 +2067,7 @@
           <a:p>
             <a:fld id="{C01C40B6-F595-44FE-8F1E-947A48DA88E2}" type="datetimeFigureOut">
               <a:rPr lang="en-US" smtClean="0"/>
-              <a:t>08/03/2019</a:t>
+              <a:t>11/03/2019</a:t>
             </a:fld>
             <a:endParaRPr lang="en-US"/>
           </a:p>
@@ -1965,7 +2265,7 @@
           <a:p>
             <a:fld id="{C01C40B6-F595-44FE-8F1E-947A48DA88E2}" type="datetimeFigureOut">
               <a:rPr lang="en-US" smtClean="0"/>
-              <a:t>08/03/2019</a:t>
+              <a:t>11/03/2019</a:t>
             </a:fld>
             <a:endParaRPr lang="en-US"/>
           </a:p>
@@ -2173,7 +2473,7 @@
           <a:p>
             <a:fld id="{C01C40B6-F595-44FE-8F1E-947A48DA88E2}" type="datetimeFigureOut">
               <a:rPr lang="en-US" smtClean="0"/>
-              <a:t>08/03/2019</a:t>
+              <a:t>11/03/2019</a:t>
             </a:fld>
             <a:endParaRPr lang="en-US"/>
           </a:p>
@@ -2371,7 +2671,7 @@
           <a:p>
             <a:fld id="{C01C40B6-F595-44FE-8F1E-947A48DA88E2}" type="datetimeFigureOut">
               <a:rPr lang="en-US" smtClean="0"/>
-              <a:t>08/03/2019</a:t>
+              <a:t>11/03/2019</a:t>
             </a:fld>
             <a:endParaRPr lang="en-US"/>
           </a:p>
@@ -2646,7 +2946,7 @@
           <a:p>
             <a:fld id="{C01C40B6-F595-44FE-8F1E-947A48DA88E2}" type="datetimeFigureOut">
               <a:rPr lang="en-US" smtClean="0"/>
-              <a:t>08/03/2019</a:t>
+              <a:t>11/03/2019</a:t>
             </a:fld>
             <a:endParaRPr lang="en-US"/>
           </a:p>
@@ -2911,7 +3211,7 @@
           <a:p>
             <a:fld id="{C01C40B6-F595-44FE-8F1E-947A48DA88E2}" type="datetimeFigureOut">
               <a:rPr lang="en-US" smtClean="0"/>
-              <a:t>08/03/2019</a:t>
+              <a:t>11/03/2019</a:t>
             </a:fld>
             <a:endParaRPr lang="en-US"/>
           </a:p>
@@ -3323,7 +3623,7 @@
           <a:p>
             <a:fld id="{C01C40B6-F595-44FE-8F1E-947A48DA88E2}" type="datetimeFigureOut">
               <a:rPr lang="en-US" smtClean="0"/>
-              <a:t>08/03/2019</a:t>
+              <a:t>11/03/2019</a:t>
             </a:fld>
             <a:endParaRPr lang="en-US"/>
           </a:p>
@@ -3464,7 +3764,7 @@
           <a:p>
             <a:fld id="{C01C40B6-F595-44FE-8F1E-947A48DA88E2}" type="datetimeFigureOut">
               <a:rPr lang="en-US" smtClean="0"/>
-              <a:t>08/03/2019</a:t>
+              <a:t>11/03/2019</a:t>
             </a:fld>
             <a:endParaRPr lang="en-US"/>
           </a:p>
@@ -3577,7 +3877,7 @@
           <a:p>
             <a:fld id="{C01C40B6-F595-44FE-8F1E-947A48DA88E2}" type="datetimeFigureOut">
               <a:rPr lang="en-US" smtClean="0"/>
-              <a:t>08/03/2019</a:t>
+              <a:t>11/03/2019</a:t>
             </a:fld>
             <a:endParaRPr lang="en-US"/>
           </a:p>
@@ -3888,7 +4188,7 @@
           <a:p>
             <a:fld id="{C01C40B6-F595-44FE-8F1E-947A48DA88E2}" type="datetimeFigureOut">
               <a:rPr lang="en-US" smtClean="0"/>
-              <a:t>08/03/2019</a:t>
+              <a:t>11/03/2019</a:t>
             </a:fld>
             <a:endParaRPr lang="en-US"/>
           </a:p>
@@ -4176,7 +4476,7 @@
           <a:p>
             <a:fld id="{C01C40B6-F595-44FE-8F1E-947A48DA88E2}" type="datetimeFigureOut">
               <a:rPr lang="en-US" smtClean="0"/>
-              <a:t>08/03/2019</a:t>
+              <a:t>11/03/2019</a:t>
             </a:fld>
             <a:endParaRPr lang="en-US"/>
           </a:p>
@@ -4417,7 +4717,7 @@
           <a:p>
             <a:fld id="{C01C40B6-F595-44FE-8F1E-947A48DA88E2}" type="datetimeFigureOut">
               <a:rPr lang="en-US" smtClean="0"/>
-              <a:t>08/03/2019</a:t>
+              <a:t>11/03/2019</a:t>
             </a:fld>
             <a:endParaRPr lang="en-US"/>
           </a:p>
@@ -5174,6 +5474,1819 @@
     <p:extLst>
       <p:ext uri="{BB962C8B-B14F-4D97-AF65-F5344CB8AC3E}">
         <p14:creationId xmlns:p14="http://schemas.microsoft.com/office/powerpoint/2010/main" val="804871162"/>
+      </p:ext>
+    </p:extLst>
+  </p:cSld>
+  <p:clrMapOvr>
+    <a:masterClrMapping/>
+  </p:clrMapOvr>
+</p:sld>
+</file>
+
+<file path=ppt/slides/slide10.xml><?xml version="1.0" encoding="utf-8"?>
+<p:sld xmlns:a="http://schemas.openxmlformats.org/drawingml/2006/main" xmlns:r="http://schemas.openxmlformats.org/officeDocument/2006/relationships" xmlns:p="http://schemas.openxmlformats.org/presentationml/2006/main">
+  <p:cSld>
+    <p:bg>
+      <p:bgPr>
+        <a:solidFill>
+          <a:schemeClr val="bg1"/>
+        </a:solidFill>
+        <a:effectLst/>
+      </p:bgPr>
+    </p:bg>
+    <p:spTree>
+      <p:nvGrpSpPr>
+        <p:cNvPr id="1" name=""/>
+        <p:cNvGrpSpPr/>
+        <p:nvPr/>
+      </p:nvGrpSpPr>
+      <p:grpSpPr>
+        <a:xfrm>
+          <a:off x="0" y="0"/>
+          <a:ext cx="0" cy="0"/>
+          <a:chOff x="0" y="0"/>
+          <a:chExt cx="0" cy="0"/>
+        </a:xfrm>
+      </p:grpSpPr>
+      <p:sp>
+        <p:nvSpPr>
+          <p:cNvPr id="16" name="Rectangle 15">
+            <a:extLst>
+              <a:ext uri="{FF2B5EF4-FFF2-40B4-BE49-F238E27FC236}">
+                <a16:creationId xmlns:a16="http://schemas.microsoft.com/office/drawing/2014/main" id="{A4AC5506-6312-4701-8D3C-40187889A947}"/>
+              </a:ext>
+              <a:ext uri="{C183D7F6-B498-43B3-948B-1728B52AA6E4}">
+                <adec:decorative xmlns:adec="http://schemas.microsoft.com/office/drawing/2017/decorative" val="1"/>
+              </a:ext>
+            </a:extLst>
+          </p:cNvPr>
+          <p:cNvSpPr>
+            <a:spLocks noGrp="1" noRot="1" noChangeAspect="1" noMove="1" noResize="1" noEditPoints="1" noAdjustHandles="1" noChangeArrowheads="1" noChangeShapeType="1" noTextEdit="1"/>
+          </p:cNvSpPr>
+          <p:nvPr>
+            <p:extLst>
+              <p:ext uri="{386F3935-93C4-4BCD-93E2-E3B085C9AB24}">
+                <p16:designElem xmlns:p16="http://schemas.microsoft.com/office/powerpoint/2015/main" val="1"/>
+              </p:ext>
+            </p:extLst>
+          </p:nvPr>
+        </p:nvSpPr>
+        <p:spPr>
+          <a:xfrm>
+            <a:off x="0" y="651752"/>
+            <a:ext cx="12192000" cy="736551"/>
+          </a:xfrm>
+          <a:prstGeom prst="rect">
+            <a:avLst/>
+          </a:prstGeom>
+          <a:solidFill>
+            <a:schemeClr val="tx1"/>
+          </a:solidFill>
+          <a:ln>
+            <a:noFill/>
+          </a:ln>
+        </p:spPr>
+        <p:style>
+          <a:lnRef idx="2">
+            <a:schemeClr val="accent1">
+              <a:shade val="50000"/>
+            </a:schemeClr>
+          </a:lnRef>
+          <a:fillRef idx="1">
+            <a:schemeClr val="accent1"/>
+          </a:fillRef>
+          <a:effectRef idx="0">
+            <a:schemeClr val="accent1"/>
+          </a:effectRef>
+          <a:fontRef idx="minor">
+            <a:schemeClr val="lt1"/>
+          </a:fontRef>
+        </p:style>
+        <p:txBody>
+          <a:bodyPr rtlCol="0" anchor="ctr"/>
+          <a:lstStyle/>
+          <a:p>
+            <a:pPr algn="ctr"/>
+            <a:endParaRPr lang="en-US"/>
+          </a:p>
+        </p:txBody>
+      </p:sp>
+      <p:sp>
+        <p:nvSpPr>
+          <p:cNvPr id="2" name="Title 1">
+            <a:extLst>
+              <a:ext uri="{FF2B5EF4-FFF2-40B4-BE49-F238E27FC236}">
+                <a16:creationId xmlns:a16="http://schemas.microsoft.com/office/drawing/2014/main" id="{7ED8D95F-23B4-4986-B699-1E67C2E8C522}"/>
+              </a:ext>
+            </a:extLst>
+          </p:cNvPr>
+          <p:cNvSpPr>
+            <a:spLocks noGrp="1"/>
+          </p:cNvSpPr>
+          <p:nvPr>
+            <p:ph type="title"/>
+          </p:nvPr>
+        </p:nvSpPr>
+        <p:spPr>
+          <a:xfrm>
+            <a:off x="556532" y="643467"/>
+            <a:ext cx="11210925" cy="744836"/>
+          </a:xfrm>
+        </p:spPr>
+        <p:txBody>
+          <a:bodyPr vert="horz" lIns="91440" tIns="45720" rIns="91440" bIns="45720" rtlCol="0" anchor="ctr">
+            <a:normAutofit/>
+          </a:bodyPr>
+          <a:lstStyle/>
+          <a:p>
+            <a:pPr algn="ctr"/>
+            <a:r>
+              <a:rPr lang="en-US" sz="3200" dirty="0">
+                <a:solidFill>
+                  <a:schemeClr val="bg1"/>
+                </a:solidFill>
+              </a:rPr>
+              <a:t>Latest year available for poverty Indicators:</a:t>
+            </a:r>
+            <a:endParaRPr lang="en-US" sz="3200" kern="1200" dirty="0">
+              <a:solidFill>
+                <a:schemeClr val="bg1"/>
+              </a:solidFill>
+              <a:latin typeface="+mj-lt"/>
+              <a:ea typeface="+mj-ea"/>
+              <a:cs typeface="+mj-cs"/>
+            </a:endParaRPr>
+          </a:p>
+        </p:txBody>
+      </p:sp>
+      <p:pic>
+        <p:nvPicPr>
+          <p:cNvPr id="8" name="Graphic 7">
+            <a:extLst>
+              <a:ext uri="{FF2B5EF4-FFF2-40B4-BE49-F238E27FC236}">
+                <a16:creationId xmlns:a16="http://schemas.microsoft.com/office/drawing/2014/main" id="{DFE941FD-B945-4090-BDAC-E63CF124034A}"/>
+              </a:ext>
+            </a:extLst>
+          </p:cNvPr>
+          <p:cNvPicPr>
+            <a:picLocks noChangeAspect="1"/>
+          </p:cNvPicPr>
+          <p:nvPr/>
+        </p:nvPicPr>
+        <p:blipFill>
+          <a:blip r:embed="rId2">
+            <a:extLst>
+              <a:ext uri="{28A0092B-C50C-407E-A947-70E740481C1C}">
+                <a14:useLocalDpi xmlns:a14="http://schemas.microsoft.com/office/drawing/2010/main" val="0"/>
+              </a:ext>
+              <a:ext uri="{96DAC541-7B7A-43D3-8B79-37D633B846F1}">
+                <asvg:svgBlip xmlns:asvg="http://schemas.microsoft.com/office/drawing/2016/SVG/main" r:embed="rId3"/>
+              </a:ext>
+            </a:extLst>
+          </a:blip>
+          <a:stretch>
+            <a:fillRect/>
+          </a:stretch>
+        </p:blipFill>
+        <p:spPr>
+          <a:xfrm>
+            <a:off x="2740152" y="1600200"/>
+            <a:ext cx="6705600" cy="5029200"/>
+          </a:xfrm>
+          <a:prstGeom prst="rect">
+            <a:avLst/>
+          </a:prstGeom>
+        </p:spPr>
+      </p:pic>
+    </p:spTree>
+    <p:extLst>
+      <p:ext uri="{BB962C8B-B14F-4D97-AF65-F5344CB8AC3E}">
+        <p14:creationId xmlns:p14="http://schemas.microsoft.com/office/powerpoint/2010/main" val="4204560451"/>
+      </p:ext>
+    </p:extLst>
+  </p:cSld>
+  <p:clrMapOvr>
+    <a:masterClrMapping/>
+  </p:clrMapOvr>
+</p:sld>
+</file>
+
+<file path=ppt/slides/slide11.xml><?xml version="1.0" encoding="utf-8"?>
+<p:sld xmlns:a="http://schemas.openxmlformats.org/drawingml/2006/main" xmlns:r="http://schemas.openxmlformats.org/officeDocument/2006/relationships" xmlns:p="http://schemas.openxmlformats.org/presentationml/2006/main">
+  <p:cSld>
+    <p:bg>
+      <p:bgPr>
+        <a:solidFill>
+          <a:schemeClr val="bg1"/>
+        </a:solidFill>
+        <a:effectLst/>
+      </p:bgPr>
+    </p:bg>
+    <p:spTree>
+      <p:nvGrpSpPr>
+        <p:cNvPr id="1" name=""/>
+        <p:cNvGrpSpPr/>
+        <p:nvPr/>
+      </p:nvGrpSpPr>
+      <p:grpSpPr>
+        <a:xfrm>
+          <a:off x="0" y="0"/>
+          <a:ext cx="0" cy="0"/>
+          <a:chOff x="0" y="0"/>
+          <a:chExt cx="0" cy="0"/>
+        </a:xfrm>
+      </p:grpSpPr>
+      <p:sp>
+        <p:nvSpPr>
+          <p:cNvPr id="16" name="Rectangle 15">
+            <a:extLst>
+              <a:ext uri="{FF2B5EF4-FFF2-40B4-BE49-F238E27FC236}">
+                <a16:creationId xmlns:a16="http://schemas.microsoft.com/office/drawing/2014/main" id="{A4AC5506-6312-4701-8D3C-40187889A947}"/>
+              </a:ext>
+              <a:ext uri="{C183D7F6-B498-43B3-948B-1728B52AA6E4}">
+                <adec:decorative xmlns:adec="http://schemas.microsoft.com/office/drawing/2017/decorative" val="1"/>
+              </a:ext>
+            </a:extLst>
+          </p:cNvPr>
+          <p:cNvSpPr>
+            <a:spLocks noGrp="1" noRot="1" noChangeAspect="1" noMove="1" noResize="1" noEditPoints="1" noAdjustHandles="1" noChangeArrowheads="1" noChangeShapeType="1" noTextEdit="1"/>
+          </p:cNvSpPr>
+          <p:nvPr>
+            <p:extLst>
+              <p:ext uri="{386F3935-93C4-4BCD-93E2-E3B085C9AB24}">
+                <p16:designElem xmlns:p16="http://schemas.microsoft.com/office/powerpoint/2015/main" val="1"/>
+              </p:ext>
+            </p:extLst>
+          </p:nvPr>
+        </p:nvSpPr>
+        <p:spPr>
+          <a:xfrm>
+            <a:off x="0" y="651752"/>
+            <a:ext cx="12192000" cy="736551"/>
+          </a:xfrm>
+          <a:prstGeom prst="rect">
+            <a:avLst/>
+          </a:prstGeom>
+          <a:solidFill>
+            <a:schemeClr val="tx1"/>
+          </a:solidFill>
+          <a:ln>
+            <a:noFill/>
+          </a:ln>
+        </p:spPr>
+        <p:style>
+          <a:lnRef idx="2">
+            <a:schemeClr val="accent1">
+              <a:shade val="50000"/>
+            </a:schemeClr>
+          </a:lnRef>
+          <a:fillRef idx="1">
+            <a:schemeClr val="accent1"/>
+          </a:fillRef>
+          <a:effectRef idx="0">
+            <a:schemeClr val="accent1"/>
+          </a:effectRef>
+          <a:fontRef idx="minor">
+            <a:schemeClr val="lt1"/>
+          </a:fontRef>
+        </p:style>
+        <p:txBody>
+          <a:bodyPr rtlCol="0" anchor="ctr"/>
+          <a:lstStyle/>
+          <a:p>
+            <a:pPr algn="ctr"/>
+            <a:endParaRPr lang="en-US"/>
+          </a:p>
+        </p:txBody>
+      </p:sp>
+      <p:sp>
+        <p:nvSpPr>
+          <p:cNvPr id="2" name="Title 1">
+            <a:extLst>
+              <a:ext uri="{FF2B5EF4-FFF2-40B4-BE49-F238E27FC236}">
+                <a16:creationId xmlns:a16="http://schemas.microsoft.com/office/drawing/2014/main" id="{7ED8D95F-23B4-4986-B699-1E67C2E8C522}"/>
+              </a:ext>
+            </a:extLst>
+          </p:cNvPr>
+          <p:cNvSpPr>
+            <a:spLocks noGrp="1"/>
+          </p:cNvSpPr>
+          <p:nvPr>
+            <p:ph type="title"/>
+          </p:nvPr>
+        </p:nvSpPr>
+        <p:spPr>
+          <a:xfrm>
+            <a:off x="556532" y="643467"/>
+            <a:ext cx="11210925" cy="744836"/>
+          </a:xfrm>
+        </p:spPr>
+        <p:txBody>
+          <a:bodyPr vert="horz" lIns="91440" tIns="45720" rIns="91440" bIns="45720" rtlCol="0" anchor="ctr">
+            <a:normAutofit/>
+          </a:bodyPr>
+          <a:lstStyle/>
+          <a:p>
+            <a:pPr algn="ctr"/>
+            <a:r>
+              <a:rPr lang="en-US" sz="3200" dirty="0">
+                <a:solidFill>
+                  <a:schemeClr val="bg1"/>
+                </a:solidFill>
+              </a:rPr>
+              <a:t>Latest year available for poverty Indicators:</a:t>
+            </a:r>
+            <a:endParaRPr lang="en-US" sz="3200" kern="1200" dirty="0">
+              <a:solidFill>
+                <a:schemeClr val="bg1"/>
+              </a:solidFill>
+              <a:latin typeface="+mj-lt"/>
+              <a:ea typeface="+mj-ea"/>
+              <a:cs typeface="+mj-cs"/>
+            </a:endParaRPr>
+          </a:p>
+        </p:txBody>
+      </p:sp>
+      <p:pic>
+        <p:nvPicPr>
+          <p:cNvPr id="4" name="Graphic 3">
+            <a:extLst>
+              <a:ext uri="{FF2B5EF4-FFF2-40B4-BE49-F238E27FC236}">
+                <a16:creationId xmlns:a16="http://schemas.microsoft.com/office/drawing/2014/main" id="{E90753FB-12AA-4491-ABDE-8D878AE9682E}"/>
+              </a:ext>
+            </a:extLst>
+          </p:cNvPr>
+          <p:cNvPicPr>
+            <a:picLocks noChangeAspect="1"/>
+          </p:cNvPicPr>
+          <p:nvPr/>
+        </p:nvPicPr>
+        <p:blipFill>
+          <a:blip r:embed="rId2">
+            <a:extLst>
+              <a:ext uri="{28A0092B-C50C-407E-A947-70E740481C1C}">
+                <a14:useLocalDpi xmlns:a14="http://schemas.microsoft.com/office/drawing/2010/main" val="0"/>
+              </a:ext>
+              <a:ext uri="{96DAC541-7B7A-43D3-8B79-37D633B846F1}">
+                <asvg:svgBlip xmlns:asvg="http://schemas.microsoft.com/office/drawing/2016/SVG/main" r:embed="rId3"/>
+              </a:ext>
+            </a:extLst>
+          </a:blip>
+          <a:stretch>
+            <a:fillRect/>
+          </a:stretch>
+        </p:blipFill>
+        <p:spPr>
+          <a:xfrm>
+            <a:off x="2740152" y="1600200"/>
+            <a:ext cx="6705600" cy="5029200"/>
+          </a:xfrm>
+          <a:prstGeom prst="rect">
+            <a:avLst/>
+          </a:prstGeom>
+        </p:spPr>
+      </p:pic>
+    </p:spTree>
+    <p:extLst>
+      <p:ext uri="{BB962C8B-B14F-4D97-AF65-F5344CB8AC3E}">
+        <p14:creationId xmlns:p14="http://schemas.microsoft.com/office/powerpoint/2010/main" val="1905659334"/>
+      </p:ext>
+    </p:extLst>
+  </p:cSld>
+  <p:clrMapOvr>
+    <a:masterClrMapping/>
+  </p:clrMapOvr>
+</p:sld>
+</file>
+
+<file path=ppt/slides/slide12.xml><?xml version="1.0" encoding="utf-8"?>
+<p:sld xmlns:a="http://schemas.openxmlformats.org/drawingml/2006/main" xmlns:r="http://schemas.openxmlformats.org/officeDocument/2006/relationships" xmlns:p="http://schemas.openxmlformats.org/presentationml/2006/main">
+  <p:cSld>
+    <p:bg>
+      <p:bgPr>
+        <a:solidFill>
+          <a:schemeClr val="bg1"/>
+        </a:solidFill>
+        <a:effectLst/>
+      </p:bgPr>
+    </p:bg>
+    <p:spTree>
+      <p:nvGrpSpPr>
+        <p:cNvPr id="1" name=""/>
+        <p:cNvGrpSpPr/>
+        <p:nvPr/>
+      </p:nvGrpSpPr>
+      <p:grpSpPr>
+        <a:xfrm>
+          <a:off x="0" y="0"/>
+          <a:ext cx="0" cy="0"/>
+          <a:chOff x="0" y="0"/>
+          <a:chExt cx="0" cy="0"/>
+        </a:xfrm>
+      </p:grpSpPr>
+      <p:sp>
+        <p:nvSpPr>
+          <p:cNvPr id="16" name="Rectangle 15">
+            <a:extLst>
+              <a:ext uri="{FF2B5EF4-FFF2-40B4-BE49-F238E27FC236}">
+                <a16:creationId xmlns:a16="http://schemas.microsoft.com/office/drawing/2014/main" id="{A4AC5506-6312-4701-8D3C-40187889A947}"/>
+              </a:ext>
+              <a:ext uri="{C183D7F6-B498-43B3-948B-1728B52AA6E4}">
+                <adec:decorative xmlns:adec="http://schemas.microsoft.com/office/drawing/2017/decorative" val="1"/>
+              </a:ext>
+            </a:extLst>
+          </p:cNvPr>
+          <p:cNvSpPr>
+            <a:spLocks noGrp="1" noRot="1" noChangeAspect="1" noMove="1" noResize="1" noEditPoints="1" noAdjustHandles="1" noChangeArrowheads="1" noChangeShapeType="1" noTextEdit="1"/>
+          </p:cNvSpPr>
+          <p:nvPr>
+            <p:extLst>
+              <p:ext uri="{386F3935-93C4-4BCD-93E2-E3B085C9AB24}">
+                <p16:designElem xmlns:p16="http://schemas.microsoft.com/office/powerpoint/2015/main" val="1"/>
+              </p:ext>
+            </p:extLst>
+          </p:nvPr>
+        </p:nvSpPr>
+        <p:spPr>
+          <a:xfrm>
+            <a:off x="0" y="651752"/>
+            <a:ext cx="12192000" cy="736551"/>
+          </a:xfrm>
+          <a:prstGeom prst="rect">
+            <a:avLst/>
+          </a:prstGeom>
+          <a:solidFill>
+            <a:schemeClr val="tx1"/>
+          </a:solidFill>
+          <a:ln>
+            <a:noFill/>
+          </a:ln>
+        </p:spPr>
+        <p:style>
+          <a:lnRef idx="2">
+            <a:schemeClr val="accent1">
+              <a:shade val="50000"/>
+            </a:schemeClr>
+          </a:lnRef>
+          <a:fillRef idx="1">
+            <a:schemeClr val="accent1"/>
+          </a:fillRef>
+          <a:effectRef idx="0">
+            <a:schemeClr val="accent1"/>
+          </a:effectRef>
+          <a:fontRef idx="minor">
+            <a:schemeClr val="lt1"/>
+          </a:fontRef>
+        </p:style>
+        <p:txBody>
+          <a:bodyPr rtlCol="0" anchor="ctr"/>
+          <a:lstStyle/>
+          <a:p>
+            <a:pPr algn="ctr"/>
+            <a:endParaRPr lang="en-US"/>
+          </a:p>
+        </p:txBody>
+      </p:sp>
+      <p:sp>
+        <p:nvSpPr>
+          <p:cNvPr id="2" name="Title 1">
+            <a:extLst>
+              <a:ext uri="{FF2B5EF4-FFF2-40B4-BE49-F238E27FC236}">
+                <a16:creationId xmlns:a16="http://schemas.microsoft.com/office/drawing/2014/main" id="{7ED8D95F-23B4-4986-B699-1E67C2E8C522}"/>
+              </a:ext>
+            </a:extLst>
+          </p:cNvPr>
+          <p:cNvSpPr>
+            <a:spLocks noGrp="1"/>
+          </p:cNvSpPr>
+          <p:nvPr>
+            <p:ph type="title"/>
+          </p:nvPr>
+        </p:nvSpPr>
+        <p:spPr>
+          <a:xfrm>
+            <a:off x="556532" y="643467"/>
+            <a:ext cx="11210925" cy="744836"/>
+          </a:xfrm>
+        </p:spPr>
+        <p:txBody>
+          <a:bodyPr vert="horz" lIns="91440" tIns="45720" rIns="91440" bIns="45720" rtlCol="0" anchor="ctr">
+            <a:normAutofit/>
+          </a:bodyPr>
+          <a:lstStyle/>
+          <a:p>
+            <a:pPr algn="ctr"/>
+            <a:r>
+              <a:rPr lang="en-US" sz="3200" dirty="0">
+                <a:solidFill>
+                  <a:schemeClr val="bg1"/>
+                </a:solidFill>
+              </a:rPr>
+              <a:t>Latest year available for poverty Indicators:</a:t>
+            </a:r>
+            <a:endParaRPr lang="en-US" sz="3200" kern="1200" dirty="0">
+              <a:solidFill>
+                <a:schemeClr val="bg1"/>
+              </a:solidFill>
+              <a:latin typeface="+mj-lt"/>
+              <a:ea typeface="+mj-ea"/>
+              <a:cs typeface="+mj-cs"/>
+            </a:endParaRPr>
+          </a:p>
+        </p:txBody>
+      </p:sp>
+      <p:pic>
+        <p:nvPicPr>
+          <p:cNvPr id="4" name="Graphic 3">
+            <a:extLst>
+              <a:ext uri="{FF2B5EF4-FFF2-40B4-BE49-F238E27FC236}">
+                <a16:creationId xmlns:a16="http://schemas.microsoft.com/office/drawing/2014/main" id="{5ECCEF79-FE8D-48FD-8F62-2BCEF2D45935}"/>
+              </a:ext>
+            </a:extLst>
+          </p:cNvPr>
+          <p:cNvPicPr>
+            <a:picLocks noChangeAspect="1"/>
+          </p:cNvPicPr>
+          <p:nvPr/>
+        </p:nvPicPr>
+        <p:blipFill>
+          <a:blip r:embed="rId2">
+            <a:extLst>
+              <a:ext uri="{28A0092B-C50C-407E-A947-70E740481C1C}">
+                <a14:useLocalDpi xmlns:a14="http://schemas.microsoft.com/office/drawing/2010/main" val="0"/>
+              </a:ext>
+              <a:ext uri="{96DAC541-7B7A-43D3-8B79-37D633B846F1}">
+                <asvg:svgBlip xmlns:asvg="http://schemas.microsoft.com/office/drawing/2016/SVG/main" r:embed="rId3"/>
+              </a:ext>
+            </a:extLst>
+          </a:blip>
+          <a:stretch>
+            <a:fillRect/>
+          </a:stretch>
+        </p:blipFill>
+        <p:spPr>
+          <a:xfrm>
+            <a:off x="2740152" y="1600200"/>
+            <a:ext cx="6705600" cy="5029200"/>
+          </a:xfrm>
+          <a:prstGeom prst="rect">
+            <a:avLst/>
+          </a:prstGeom>
+        </p:spPr>
+      </p:pic>
+    </p:spTree>
+    <p:extLst>
+      <p:ext uri="{BB962C8B-B14F-4D97-AF65-F5344CB8AC3E}">
+        <p14:creationId xmlns:p14="http://schemas.microsoft.com/office/powerpoint/2010/main" val="461336054"/>
+      </p:ext>
+    </p:extLst>
+  </p:cSld>
+  <p:clrMapOvr>
+    <a:masterClrMapping/>
+  </p:clrMapOvr>
+</p:sld>
+</file>
+
+<file path=ppt/slides/slide13.xml><?xml version="1.0" encoding="utf-8"?>
+<p:sld xmlns:a="http://schemas.openxmlformats.org/drawingml/2006/main" xmlns:r="http://schemas.openxmlformats.org/officeDocument/2006/relationships" xmlns:p="http://schemas.openxmlformats.org/presentationml/2006/main">
+  <p:cSld>
+    <p:bg>
+      <p:bgPr>
+        <a:solidFill>
+          <a:schemeClr val="bg1"/>
+        </a:solidFill>
+        <a:effectLst/>
+      </p:bgPr>
+    </p:bg>
+    <p:spTree>
+      <p:nvGrpSpPr>
+        <p:cNvPr id="1" name=""/>
+        <p:cNvGrpSpPr/>
+        <p:nvPr/>
+      </p:nvGrpSpPr>
+      <p:grpSpPr>
+        <a:xfrm>
+          <a:off x="0" y="0"/>
+          <a:ext cx="0" cy="0"/>
+          <a:chOff x="0" y="0"/>
+          <a:chExt cx="0" cy="0"/>
+        </a:xfrm>
+      </p:grpSpPr>
+      <p:sp>
+        <p:nvSpPr>
+          <p:cNvPr id="16" name="Rectangle 15">
+            <a:extLst>
+              <a:ext uri="{FF2B5EF4-FFF2-40B4-BE49-F238E27FC236}">
+                <a16:creationId xmlns:a16="http://schemas.microsoft.com/office/drawing/2014/main" id="{A4AC5506-6312-4701-8D3C-40187889A947}"/>
+              </a:ext>
+              <a:ext uri="{C183D7F6-B498-43B3-948B-1728B52AA6E4}">
+                <adec:decorative xmlns:adec="http://schemas.microsoft.com/office/drawing/2017/decorative" val="1"/>
+              </a:ext>
+            </a:extLst>
+          </p:cNvPr>
+          <p:cNvSpPr>
+            <a:spLocks noGrp="1" noRot="1" noChangeAspect="1" noMove="1" noResize="1" noEditPoints="1" noAdjustHandles="1" noChangeArrowheads="1" noChangeShapeType="1" noTextEdit="1"/>
+          </p:cNvSpPr>
+          <p:nvPr>
+            <p:extLst>
+              <p:ext uri="{386F3935-93C4-4BCD-93E2-E3B085C9AB24}">
+                <p16:designElem xmlns:p16="http://schemas.microsoft.com/office/powerpoint/2015/main" val="1"/>
+              </p:ext>
+            </p:extLst>
+          </p:nvPr>
+        </p:nvSpPr>
+        <p:spPr>
+          <a:xfrm>
+            <a:off x="0" y="651752"/>
+            <a:ext cx="12192000" cy="736551"/>
+          </a:xfrm>
+          <a:prstGeom prst="rect">
+            <a:avLst/>
+          </a:prstGeom>
+          <a:solidFill>
+            <a:schemeClr val="tx1"/>
+          </a:solidFill>
+          <a:ln>
+            <a:noFill/>
+          </a:ln>
+        </p:spPr>
+        <p:style>
+          <a:lnRef idx="2">
+            <a:schemeClr val="accent1">
+              <a:shade val="50000"/>
+            </a:schemeClr>
+          </a:lnRef>
+          <a:fillRef idx="1">
+            <a:schemeClr val="accent1"/>
+          </a:fillRef>
+          <a:effectRef idx="0">
+            <a:schemeClr val="accent1"/>
+          </a:effectRef>
+          <a:fontRef idx="minor">
+            <a:schemeClr val="lt1"/>
+          </a:fontRef>
+        </p:style>
+        <p:txBody>
+          <a:bodyPr rtlCol="0" anchor="ctr"/>
+          <a:lstStyle/>
+          <a:p>
+            <a:pPr algn="ctr"/>
+            <a:endParaRPr lang="en-US"/>
+          </a:p>
+        </p:txBody>
+      </p:sp>
+      <p:sp>
+        <p:nvSpPr>
+          <p:cNvPr id="2" name="Title 1">
+            <a:extLst>
+              <a:ext uri="{FF2B5EF4-FFF2-40B4-BE49-F238E27FC236}">
+                <a16:creationId xmlns:a16="http://schemas.microsoft.com/office/drawing/2014/main" id="{7ED8D95F-23B4-4986-B699-1E67C2E8C522}"/>
+              </a:ext>
+            </a:extLst>
+          </p:cNvPr>
+          <p:cNvSpPr>
+            <a:spLocks noGrp="1"/>
+          </p:cNvSpPr>
+          <p:nvPr>
+            <p:ph type="title"/>
+          </p:nvPr>
+        </p:nvSpPr>
+        <p:spPr>
+          <a:xfrm>
+            <a:off x="556532" y="643467"/>
+            <a:ext cx="11210925" cy="744836"/>
+          </a:xfrm>
+        </p:spPr>
+        <p:txBody>
+          <a:bodyPr vert="horz" lIns="91440" tIns="45720" rIns="91440" bIns="45720" rtlCol="0" anchor="ctr">
+            <a:normAutofit/>
+          </a:bodyPr>
+          <a:lstStyle/>
+          <a:p>
+            <a:pPr algn="ctr"/>
+            <a:r>
+              <a:rPr lang="en-US" sz="3200" dirty="0">
+                <a:solidFill>
+                  <a:schemeClr val="bg1"/>
+                </a:solidFill>
+              </a:rPr>
+              <a:t>Latest year available for poverty Indicators:</a:t>
+            </a:r>
+            <a:endParaRPr lang="en-US" sz="3200" kern="1200" dirty="0">
+              <a:solidFill>
+                <a:schemeClr val="bg1"/>
+              </a:solidFill>
+              <a:latin typeface="+mj-lt"/>
+              <a:ea typeface="+mj-ea"/>
+              <a:cs typeface="+mj-cs"/>
+            </a:endParaRPr>
+          </a:p>
+        </p:txBody>
+      </p:sp>
+      <p:pic>
+        <p:nvPicPr>
+          <p:cNvPr id="4" name="Graphic 3">
+            <a:extLst>
+              <a:ext uri="{FF2B5EF4-FFF2-40B4-BE49-F238E27FC236}">
+                <a16:creationId xmlns:a16="http://schemas.microsoft.com/office/drawing/2014/main" id="{334CD17A-78CC-4B70-B1B1-8DF529BF4E41}"/>
+              </a:ext>
+            </a:extLst>
+          </p:cNvPr>
+          <p:cNvPicPr>
+            <a:picLocks noChangeAspect="1"/>
+          </p:cNvPicPr>
+          <p:nvPr/>
+        </p:nvPicPr>
+        <p:blipFill>
+          <a:blip r:embed="rId2">
+            <a:extLst>
+              <a:ext uri="{28A0092B-C50C-407E-A947-70E740481C1C}">
+                <a14:useLocalDpi xmlns:a14="http://schemas.microsoft.com/office/drawing/2010/main" val="0"/>
+              </a:ext>
+              <a:ext uri="{96DAC541-7B7A-43D3-8B79-37D633B846F1}">
+                <asvg:svgBlip xmlns:asvg="http://schemas.microsoft.com/office/drawing/2016/SVG/main" r:embed="rId3"/>
+              </a:ext>
+            </a:extLst>
+          </a:blip>
+          <a:stretch>
+            <a:fillRect/>
+          </a:stretch>
+        </p:blipFill>
+        <p:spPr>
+          <a:xfrm>
+            <a:off x="2740152" y="1600200"/>
+            <a:ext cx="6705600" cy="5029200"/>
+          </a:xfrm>
+          <a:prstGeom prst="rect">
+            <a:avLst/>
+          </a:prstGeom>
+        </p:spPr>
+      </p:pic>
+    </p:spTree>
+    <p:extLst>
+      <p:ext uri="{BB962C8B-B14F-4D97-AF65-F5344CB8AC3E}">
+        <p14:creationId xmlns:p14="http://schemas.microsoft.com/office/powerpoint/2010/main" val="3017265368"/>
+      </p:ext>
+    </p:extLst>
+  </p:cSld>
+  <p:clrMapOvr>
+    <a:masterClrMapping/>
+  </p:clrMapOvr>
+</p:sld>
+</file>
+
+<file path=ppt/slides/slide14.xml><?xml version="1.0" encoding="utf-8"?>
+<p:sld xmlns:a="http://schemas.openxmlformats.org/drawingml/2006/main" xmlns:r="http://schemas.openxmlformats.org/officeDocument/2006/relationships" xmlns:p="http://schemas.openxmlformats.org/presentationml/2006/main">
+  <p:cSld>
+    <p:bg>
+      <p:bgPr>
+        <a:solidFill>
+          <a:schemeClr val="bg1"/>
+        </a:solidFill>
+        <a:effectLst/>
+      </p:bgPr>
+    </p:bg>
+    <p:spTree>
+      <p:nvGrpSpPr>
+        <p:cNvPr id="1" name=""/>
+        <p:cNvGrpSpPr/>
+        <p:nvPr/>
+      </p:nvGrpSpPr>
+      <p:grpSpPr>
+        <a:xfrm>
+          <a:off x="0" y="0"/>
+          <a:ext cx="0" cy="0"/>
+          <a:chOff x="0" y="0"/>
+          <a:chExt cx="0" cy="0"/>
+        </a:xfrm>
+      </p:grpSpPr>
+      <p:sp>
+        <p:nvSpPr>
+          <p:cNvPr id="16" name="Rectangle 15">
+            <a:extLst>
+              <a:ext uri="{FF2B5EF4-FFF2-40B4-BE49-F238E27FC236}">
+                <a16:creationId xmlns:a16="http://schemas.microsoft.com/office/drawing/2014/main" id="{A4AC5506-6312-4701-8D3C-40187889A947}"/>
+              </a:ext>
+              <a:ext uri="{C183D7F6-B498-43B3-948B-1728B52AA6E4}">
+                <adec:decorative xmlns:adec="http://schemas.microsoft.com/office/drawing/2017/decorative" val="1"/>
+              </a:ext>
+            </a:extLst>
+          </p:cNvPr>
+          <p:cNvSpPr>
+            <a:spLocks noGrp="1" noRot="1" noChangeAspect="1" noMove="1" noResize="1" noEditPoints="1" noAdjustHandles="1" noChangeArrowheads="1" noChangeShapeType="1" noTextEdit="1"/>
+          </p:cNvSpPr>
+          <p:nvPr>
+            <p:extLst>
+              <p:ext uri="{386F3935-93C4-4BCD-93E2-E3B085C9AB24}">
+                <p16:designElem xmlns:p16="http://schemas.microsoft.com/office/powerpoint/2015/main" val="1"/>
+              </p:ext>
+            </p:extLst>
+          </p:nvPr>
+        </p:nvSpPr>
+        <p:spPr>
+          <a:xfrm>
+            <a:off x="0" y="651752"/>
+            <a:ext cx="12192000" cy="736551"/>
+          </a:xfrm>
+          <a:prstGeom prst="rect">
+            <a:avLst/>
+          </a:prstGeom>
+          <a:solidFill>
+            <a:schemeClr val="tx1"/>
+          </a:solidFill>
+          <a:ln>
+            <a:noFill/>
+          </a:ln>
+        </p:spPr>
+        <p:style>
+          <a:lnRef idx="2">
+            <a:schemeClr val="accent1">
+              <a:shade val="50000"/>
+            </a:schemeClr>
+          </a:lnRef>
+          <a:fillRef idx="1">
+            <a:schemeClr val="accent1"/>
+          </a:fillRef>
+          <a:effectRef idx="0">
+            <a:schemeClr val="accent1"/>
+          </a:effectRef>
+          <a:fontRef idx="minor">
+            <a:schemeClr val="lt1"/>
+          </a:fontRef>
+        </p:style>
+        <p:txBody>
+          <a:bodyPr rtlCol="0" anchor="ctr"/>
+          <a:lstStyle/>
+          <a:p>
+            <a:pPr algn="ctr"/>
+            <a:endParaRPr lang="en-US"/>
+          </a:p>
+        </p:txBody>
+      </p:sp>
+      <p:sp>
+        <p:nvSpPr>
+          <p:cNvPr id="2" name="Title 1">
+            <a:extLst>
+              <a:ext uri="{FF2B5EF4-FFF2-40B4-BE49-F238E27FC236}">
+                <a16:creationId xmlns:a16="http://schemas.microsoft.com/office/drawing/2014/main" id="{7ED8D95F-23B4-4986-B699-1E67C2E8C522}"/>
+              </a:ext>
+            </a:extLst>
+          </p:cNvPr>
+          <p:cNvSpPr>
+            <a:spLocks noGrp="1"/>
+          </p:cNvSpPr>
+          <p:nvPr>
+            <p:ph type="title"/>
+          </p:nvPr>
+        </p:nvSpPr>
+        <p:spPr>
+          <a:xfrm>
+            <a:off x="556532" y="643467"/>
+            <a:ext cx="11210925" cy="744836"/>
+          </a:xfrm>
+        </p:spPr>
+        <p:txBody>
+          <a:bodyPr vert="horz" lIns="91440" tIns="45720" rIns="91440" bIns="45720" rtlCol="0" anchor="ctr">
+            <a:normAutofit/>
+          </a:bodyPr>
+          <a:lstStyle/>
+          <a:p>
+            <a:pPr algn="ctr"/>
+            <a:r>
+              <a:rPr lang="en-US" sz="3200" dirty="0">
+                <a:solidFill>
+                  <a:schemeClr val="bg1"/>
+                </a:solidFill>
+              </a:rPr>
+              <a:t>Latest year available for poverty Indicators:</a:t>
+            </a:r>
+            <a:endParaRPr lang="en-US" sz="3200" kern="1200" dirty="0">
+              <a:solidFill>
+                <a:schemeClr val="bg1"/>
+              </a:solidFill>
+              <a:latin typeface="+mj-lt"/>
+              <a:ea typeface="+mj-ea"/>
+              <a:cs typeface="+mj-cs"/>
+            </a:endParaRPr>
+          </a:p>
+        </p:txBody>
+      </p:sp>
+      <p:pic>
+        <p:nvPicPr>
+          <p:cNvPr id="4" name="Graphic 3">
+            <a:extLst>
+              <a:ext uri="{FF2B5EF4-FFF2-40B4-BE49-F238E27FC236}">
+                <a16:creationId xmlns:a16="http://schemas.microsoft.com/office/drawing/2014/main" id="{354B1AEE-C0C2-4232-94C9-28ADC80811D2}"/>
+              </a:ext>
+            </a:extLst>
+          </p:cNvPr>
+          <p:cNvPicPr>
+            <a:picLocks noChangeAspect="1"/>
+          </p:cNvPicPr>
+          <p:nvPr/>
+        </p:nvPicPr>
+        <p:blipFill>
+          <a:blip r:embed="rId2">
+            <a:extLst>
+              <a:ext uri="{28A0092B-C50C-407E-A947-70E740481C1C}">
+                <a14:useLocalDpi xmlns:a14="http://schemas.microsoft.com/office/drawing/2010/main" val="0"/>
+              </a:ext>
+              <a:ext uri="{96DAC541-7B7A-43D3-8B79-37D633B846F1}">
+                <asvg:svgBlip xmlns:asvg="http://schemas.microsoft.com/office/drawing/2016/SVG/main" r:embed="rId3"/>
+              </a:ext>
+            </a:extLst>
+          </a:blip>
+          <a:stretch>
+            <a:fillRect/>
+          </a:stretch>
+        </p:blipFill>
+        <p:spPr>
+          <a:xfrm>
+            <a:off x="2740152" y="1600200"/>
+            <a:ext cx="6705600" cy="5029200"/>
+          </a:xfrm>
+          <a:prstGeom prst="rect">
+            <a:avLst/>
+          </a:prstGeom>
+        </p:spPr>
+      </p:pic>
+    </p:spTree>
+    <p:extLst>
+      <p:ext uri="{BB962C8B-B14F-4D97-AF65-F5344CB8AC3E}">
+        <p14:creationId xmlns:p14="http://schemas.microsoft.com/office/powerpoint/2010/main" val="4224875666"/>
+      </p:ext>
+    </p:extLst>
+  </p:cSld>
+  <p:clrMapOvr>
+    <a:masterClrMapping/>
+  </p:clrMapOvr>
+</p:sld>
+</file>
+
+<file path=ppt/slides/slide15.xml><?xml version="1.0" encoding="utf-8"?>
+<p:sld xmlns:a="http://schemas.openxmlformats.org/drawingml/2006/main" xmlns:r="http://schemas.openxmlformats.org/officeDocument/2006/relationships" xmlns:p="http://schemas.openxmlformats.org/presentationml/2006/main">
+  <p:cSld>
+    <p:bg>
+      <p:bgPr>
+        <a:solidFill>
+          <a:schemeClr val="bg1"/>
+        </a:solidFill>
+        <a:effectLst/>
+      </p:bgPr>
+    </p:bg>
+    <p:spTree>
+      <p:nvGrpSpPr>
+        <p:cNvPr id="1" name=""/>
+        <p:cNvGrpSpPr/>
+        <p:nvPr/>
+      </p:nvGrpSpPr>
+      <p:grpSpPr>
+        <a:xfrm>
+          <a:off x="0" y="0"/>
+          <a:ext cx="0" cy="0"/>
+          <a:chOff x="0" y="0"/>
+          <a:chExt cx="0" cy="0"/>
+        </a:xfrm>
+      </p:grpSpPr>
+      <p:sp>
+        <p:nvSpPr>
+          <p:cNvPr id="16" name="Rectangle 15">
+            <a:extLst>
+              <a:ext uri="{FF2B5EF4-FFF2-40B4-BE49-F238E27FC236}">
+                <a16:creationId xmlns:a16="http://schemas.microsoft.com/office/drawing/2014/main" id="{A4AC5506-6312-4701-8D3C-40187889A947}"/>
+              </a:ext>
+              <a:ext uri="{C183D7F6-B498-43B3-948B-1728B52AA6E4}">
+                <adec:decorative xmlns:adec="http://schemas.microsoft.com/office/drawing/2017/decorative" val="1"/>
+              </a:ext>
+            </a:extLst>
+          </p:cNvPr>
+          <p:cNvSpPr>
+            <a:spLocks noGrp="1" noRot="1" noChangeAspect="1" noMove="1" noResize="1" noEditPoints="1" noAdjustHandles="1" noChangeArrowheads="1" noChangeShapeType="1" noTextEdit="1"/>
+          </p:cNvSpPr>
+          <p:nvPr>
+            <p:extLst>
+              <p:ext uri="{386F3935-93C4-4BCD-93E2-E3B085C9AB24}">
+                <p16:designElem xmlns:p16="http://schemas.microsoft.com/office/powerpoint/2015/main" val="1"/>
+              </p:ext>
+            </p:extLst>
+          </p:nvPr>
+        </p:nvSpPr>
+        <p:spPr>
+          <a:xfrm>
+            <a:off x="0" y="651752"/>
+            <a:ext cx="12192000" cy="736551"/>
+          </a:xfrm>
+          <a:prstGeom prst="rect">
+            <a:avLst/>
+          </a:prstGeom>
+          <a:solidFill>
+            <a:schemeClr val="tx1"/>
+          </a:solidFill>
+          <a:ln>
+            <a:noFill/>
+          </a:ln>
+        </p:spPr>
+        <p:style>
+          <a:lnRef idx="2">
+            <a:schemeClr val="accent1">
+              <a:shade val="50000"/>
+            </a:schemeClr>
+          </a:lnRef>
+          <a:fillRef idx="1">
+            <a:schemeClr val="accent1"/>
+          </a:fillRef>
+          <a:effectRef idx="0">
+            <a:schemeClr val="accent1"/>
+          </a:effectRef>
+          <a:fontRef idx="minor">
+            <a:schemeClr val="lt1"/>
+          </a:fontRef>
+        </p:style>
+        <p:txBody>
+          <a:bodyPr rtlCol="0" anchor="ctr"/>
+          <a:lstStyle/>
+          <a:p>
+            <a:pPr algn="ctr"/>
+            <a:endParaRPr lang="en-US"/>
+          </a:p>
+        </p:txBody>
+      </p:sp>
+      <p:sp>
+        <p:nvSpPr>
+          <p:cNvPr id="2" name="Title 1">
+            <a:extLst>
+              <a:ext uri="{FF2B5EF4-FFF2-40B4-BE49-F238E27FC236}">
+                <a16:creationId xmlns:a16="http://schemas.microsoft.com/office/drawing/2014/main" id="{7ED8D95F-23B4-4986-B699-1E67C2E8C522}"/>
+              </a:ext>
+            </a:extLst>
+          </p:cNvPr>
+          <p:cNvSpPr>
+            <a:spLocks noGrp="1"/>
+          </p:cNvSpPr>
+          <p:nvPr>
+            <p:ph type="title"/>
+          </p:nvPr>
+        </p:nvSpPr>
+        <p:spPr>
+          <a:xfrm>
+            <a:off x="556532" y="643467"/>
+            <a:ext cx="11210925" cy="744836"/>
+          </a:xfrm>
+        </p:spPr>
+        <p:txBody>
+          <a:bodyPr vert="horz" lIns="91440" tIns="45720" rIns="91440" bIns="45720" rtlCol="0" anchor="ctr">
+            <a:normAutofit/>
+          </a:bodyPr>
+          <a:lstStyle/>
+          <a:p>
+            <a:pPr algn="ctr"/>
+            <a:r>
+              <a:rPr lang="en-US" sz="3200" dirty="0">
+                <a:solidFill>
+                  <a:schemeClr val="bg1"/>
+                </a:solidFill>
+              </a:rPr>
+              <a:t>Latest year available for poverty Indicators:</a:t>
+            </a:r>
+            <a:endParaRPr lang="en-US" sz="3200" kern="1200" dirty="0">
+              <a:solidFill>
+                <a:schemeClr val="bg1"/>
+              </a:solidFill>
+              <a:latin typeface="+mj-lt"/>
+              <a:ea typeface="+mj-ea"/>
+              <a:cs typeface="+mj-cs"/>
+            </a:endParaRPr>
+          </a:p>
+        </p:txBody>
+      </p:sp>
+      <p:pic>
+        <p:nvPicPr>
+          <p:cNvPr id="4" name="Graphic 3">
+            <a:extLst>
+              <a:ext uri="{FF2B5EF4-FFF2-40B4-BE49-F238E27FC236}">
+                <a16:creationId xmlns:a16="http://schemas.microsoft.com/office/drawing/2014/main" id="{8E2EA37D-482A-4F5E-8875-1D8E9FCB0651}"/>
+              </a:ext>
+            </a:extLst>
+          </p:cNvPr>
+          <p:cNvPicPr>
+            <a:picLocks noChangeAspect="1"/>
+          </p:cNvPicPr>
+          <p:nvPr/>
+        </p:nvPicPr>
+        <p:blipFill>
+          <a:blip r:embed="rId2">
+            <a:extLst>
+              <a:ext uri="{28A0092B-C50C-407E-A947-70E740481C1C}">
+                <a14:useLocalDpi xmlns:a14="http://schemas.microsoft.com/office/drawing/2010/main" val="0"/>
+              </a:ext>
+              <a:ext uri="{96DAC541-7B7A-43D3-8B79-37D633B846F1}">
+                <asvg:svgBlip xmlns:asvg="http://schemas.microsoft.com/office/drawing/2016/SVG/main" r:embed="rId3"/>
+              </a:ext>
+            </a:extLst>
+          </a:blip>
+          <a:stretch>
+            <a:fillRect/>
+          </a:stretch>
+        </p:blipFill>
+        <p:spPr>
+          <a:xfrm>
+            <a:off x="2740152" y="1600200"/>
+            <a:ext cx="6705600" cy="5029200"/>
+          </a:xfrm>
+          <a:prstGeom prst="rect">
+            <a:avLst/>
+          </a:prstGeom>
+        </p:spPr>
+      </p:pic>
+    </p:spTree>
+    <p:extLst>
+      <p:ext uri="{BB962C8B-B14F-4D97-AF65-F5344CB8AC3E}">
+        <p14:creationId xmlns:p14="http://schemas.microsoft.com/office/powerpoint/2010/main" val="4141030355"/>
+      </p:ext>
+    </p:extLst>
+  </p:cSld>
+  <p:clrMapOvr>
+    <a:masterClrMapping/>
+  </p:clrMapOvr>
+</p:sld>
+</file>
+
+<file path=ppt/slides/slide16.xml><?xml version="1.0" encoding="utf-8"?>
+<p:sld xmlns:a="http://schemas.openxmlformats.org/drawingml/2006/main" xmlns:r="http://schemas.openxmlformats.org/officeDocument/2006/relationships" xmlns:p="http://schemas.openxmlformats.org/presentationml/2006/main">
+  <p:cSld>
+    <p:bg>
+      <p:bgPr>
+        <a:solidFill>
+          <a:schemeClr val="bg1"/>
+        </a:solidFill>
+        <a:effectLst/>
+      </p:bgPr>
+    </p:bg>
+    <p:spTree>
+      <p:nvGrpSpPr>
+        <p:cNvPr id="1" name=""/>
+        <p:cNvGrpSpPr/>
+        <p:nvPr/>
+      </p:nvGrpSpPr>
+      <p:grpSpPr>
+        <a:xfrm>
+          <a:off x="0" y="0"/>
+          <a:ext cx="0" cy="0"/>
+          <a:chOff x="0" y="0"/>
+          <a:chExt cx="0" cy="0"/>
+        </a:xfrm>
+      </p:grpSpPr>
+      <p:sp>
+        <p:nvSpPr>
+          <p:cNvPr id="16" name="Rectangle 15">
+            <a:extLst>
+              <a:ext uri="{FF2B5EF4-FFF2-40B4-BE49-F238E27FC236}">
+                <a16:creationId xmlns:a16="http://schemas.microsoft.com/office/drawing/2014/main" id="{A4AC5506-6312-4701-8D3C-40187889A947}"/>
+              </a:ext>
+              <a:ext uri="{C183D7F6-B498-43B3-948B-1728B52AA6E4}">
+                <adec:decorative xmlns:adec="http://schemas.microsoft.com/office/drawing/2017/decorative" val="1"/>
+              </a:ext>
+            </a:extLst>
+          </p:cNvPr>
+          <p:cNvSpPr>
+            <a:spLocks noGrp="1" noRot="1" noChangeAspect="1" noMove="1" noResize="1" noEditPoints="1" noAdjustHandles="1" noChangeArrowheads="1" noChangeShapeType="1" noTextEdit="1"/>
+          </p:cNvSpPr>
+          <p:nvPr>
+            <p:extLst>
+              <p:ext uri="{386F3935-93C4-4BCD-93E2-E3B085C9AB24}">
+                <p16:designElem xmlns:p16="http://schemas.microsoft.com/office/powerpoint/2015/main" val="1"/>
+              </p:ext>
+            </p:extLst>
+          </p:nvPr>
+        </p:nvSpPr>
+        <p:spPr>
+          <a:xfrm>
+            <a:off x="0" y="651752"/>
+            <a:ext cx="12192000" cy="736551"/>
+          </a:xfrm>
+          <a:prstGeom prst="rect">
+            <a:avLst/>
+          </a:prstGeom>
+          <a:solidFill>
+            <a:schemeClr val="tx1"/>
+          </a:solidFill>
+          <a:ln>
+            <a:noFill/>
+          </a:ln>
+        </p:spPr>
+        <p:style>
+          <a:lnRef idx="2">
+            <a:schemeClr val="accent1">
+              <a:shade val="50000"/>
+            </a:schemeClr>
+          </a:lnRef>
+          <a:fillRef idx="1">
+            <a:schemeClr val="accent1"/>
+          </a:fillRef>
+          <a:effectRef idx="0">
+            <a:schemeClr val="accent1"/>
+          </a:effectRef>
+          <a:fontRef idx="minor">
+            <a:schemeClr val="lt1"/>
+          </a:fontRef>
+        </p:style>
+        <p:txBody>
+          <a:bodyPr rtlCol="0" anchor="ctr"/>
+          <a:lstStyle/>
+          <a:p>
+            <a:pPr algn="ctr"/>
+            <a:endParaRPr lang="en-US"/>
+          </a:p>
+        </p:txBody>
+      </p:sp>
+      <p:sp>
+        <p:nvSpPr>
+          <p:cNvPr id="2" name="Title 1">
+            <a:extLst>
+              <a:ext uri="{FF2B5EF4-FFF2-40B4-BE49-F238E27FC236}">
+                <a16:creationId xmlns:a16="http://schemas.microsoft.com/office/drawing/2014/main" id="{7ED8D95F-23B4-4986-B699-1E67C2E8C522}"/>
+              </a:ext>
+            </a:extLst>
+          </p:cNvPr>
+          <p:cNvSpPr>
+            <a:spLocks noGrp="1"/>
+          </p:cNvSpPr>
+          <p:nvPr>
+            <p:ph type="title"/>
+          </p:nvPr>
+        </p:nvSpPr>
+        <p:spPr>
+          <a:xfrm>
+            <a:off x="556532" y="643467"/>
+            <a:ext cx="11210925" cy="744836"/>
+          </a:xfrm>
+        </p:spPr>
+        <p:txBody>
+          <a:bodyPr vert="horz" lIns="91440" tIns="45720" rIns="91440" bIns="45720" rtlCol="0" anchor="ctr">
+            <a:normAutofit/>
+          </a:bodyPr>
+          <a:lstStyle/>
+          <a:p>
+            <a:pPr algn="ctr"/>
+            <a:r>
+              <a:rPr lang="en-US" sz="3200" dirty="0">
+                <a:solidFill>
+                  <a:schemeClr val="bg1"/>
+                </a:solidFill>
+              </a:rPr>
+              <a:t>Latest year available for poverty Indicators:</a:t>
+            </a:r>
+            <a:endParaRPr lang="en-US" sz="3200" kern="1200" dirty="0">
+              <a:solidFill>
+                <a:schemeClr val="bg1"/>
+              </a:solidFill>
+              <a:latin typeface="+mj-lt"/>
+              <a:ea typeface="+mj-ea"/>
+              <a:cs typeface="+mj-cs"/>
+            </a:endParaRPr>
+          </a:p>
+        </p:txBody>
+      </p:sp>
+      <p:pic>
+        <p:nvPicPr>
+          <p:cNvPr id="4" name="Graphic 3">
+            <a:extLst>
+              <a:ext uri="{FF2B5EF4-FFF2-40B4-BE49-F238E27FC236}">
+                <a16:creationId xmlns:a16="http://schemas.microsoft.com/office/drawing/2014/main" id="{AC6AA9FD-5EE1-489B-97BD-6552CC2F3B31}"/>
+              </a:ext>
+            </a:extLst>
+          </p:cNvPr>
+          <p:cNvPicPr>
+            <a:picLocks noChangeAspect="1"/>
+          </p:cNvPicPr>
+          <p:nvPr/>
+        </p:nvPicPr>
+        <p:blipFill>
+          <a:blip r:embed="rId2">
+            <a:extLst>
+              <a:ext uri="{28A0092B-C50C-407E-A947-70E740481C1C}">
+                <a14:useLocalDpi xmlns:a14="http://schemas.microsoft.com/office/drawing/2010/main" val="0"/>
+              </a:ext>
+              <a:ext uri="{96DAC541-7B7A-43D3-8B79-37D633B846F1}">
+                <asvg:svgBlip xmlns:asvg="http://schemas.microsoft.com/office/drawing/2016/SVG/main" r:embed="rId3"/>
+              </a:ext>
+            </a:extLst>
+          </a:blip>
+          <a:stretch>
+            <a:fillRect/>
+          </a:stretch>
+        </p:blipFill>
+        <p:spPr>
+          <a:xfrm>
+            <a:off x="2740152" y="1600200"/>
+            <a:ext cx="6705600" cy="5029200"/>
+          </a:xfrm>
+          <a:prstGeom prst="rect">
+            <a:avLst/>
+          </a:prstGeom>
+        </p:spPr>
+      </p:pic>
+    </p:spTree>
+    <p:extLst>
+      <p:ext uri="{BB962C8B-B14F-4D97-AF65-F5344CB8AC3E}">
+        <p14:creationId xmlns:p14="http://schemas.microsoft.com/office/powerpoint/2010/main" val="3275887000"/>
+      </p:ext>
+    </p:extLst>
+  </p:cSld>
+  <p:clrMapOvr>
+    <a:masterClrMapping/>
+  </p:clrMapOvr>
+</p:sld>
+</file>
+
+<file path=ppt/slides/slide17.xml><?xml version="1.0" encoding="utf-8"?>
+<p:sld xmlns:a="http://schemas.openxmlformats.org/drawingml/2006/main" xmlns:r="http://schemas.openxmlformats.org/officeDocument/2006/relationships" xmlns:p="http://schemas.openxmlformats.org/presentationml/2006/main">
+  <p:cSld>
+    <p:bg>
+      <p:bgPr>
+        <a:solidFill>
+          <a:schemeClr val="bg1"/>
+        </a:solidFill>
+        <a:effectLst/>
+      </p:bgPr>
+    </p:bg>
+    <p:spTree>
+      <p:nvGrpSpPr>
+        <p:cNvPr id="1" name=""/>
+        <p:cNvGrpSpPr/>
+        <p:nvPr/>
+      </p:nvGrpSpPr>
+      <p:grpSpPr>
+        <a:xfrm>
+          <a:off x="0" y="0"/>
+          <a:ext cx="0" cy="0"/>
+          <a:chOff x="0" y="0"/>
+          <a:chExt cx="0" cy="0"/>
+        </a:xfrm>
+      </p:grpSpPr>
+      <p:sp>
+        <p:nvSpPr>
+          <p:cNvPr id="16" name="Rectangle 15">
+            <a:extLst>
+              <a:ext uri="{FF2B5EF4-FFF2-40B4-BE49-F238E27FC236}">
+                <a16:creationId xmlns:a16="http://schemas.microsoft.com/office/drawing/2014/main" id="{A4AC5506-6312-4701-8D3C-40187889A947}"/>
+              </a:ext>
+              <a:ext uri="{C183D7F6-B498-43B3-948B-1728B52AA6E4}">
+                <adec:decorative xmlns:adec="http://schemas.microsoft.com/office/drawing/2017/decorative" val="1"/>
+              </a:ext>
+            </a:extLst>
+          </p:cNvPr>
+          <p:cNvSpPr>
+            <a:spLocks noGrp="1" noRot="1" noChangeAspect="1" noMove="1" noResize="1" noEditPoints="1" noAdjustHandles="1" noChangeArrowheads="1" noChangeShapeType="1" noTextEdit="1"/>
+          </p:cNvSpPr>
+          <p:nvPr>
+            <p:extLst>
+              <p:ext uri="{386F3935-93C4-4BCD-93E2-E3B085C9AB24}">
+                <p16:designElem xmlns:p16="http://schemas.microsoft.com/office/powerpoint/2015/main" val="1"/>
+              </p:ext>
+            </p:extLst>
+          </p:nvPr>
+        </p:nvSpPr>
+        <p:spPr>
+          <a:xfrm>
+            <a:off x="0" y="651752"/>
+            <a:ext cx="12192000" cy="736551"/>
+          </a:xfrm>
+          <a:prstGeom prst="rect">
+            <a:avLst/>
+          </a:prstGeom>
+          <a:solidFill>
+            <a:schemeClr val="tx1"/>
+          </a:solidFill>
+          <a:ln>
+            <a:noFill/>
+          </a:ln>
+        </p:spPr>
+        <p:style>
+          <a:lnRef idx="2">
+            <a:schemeClr val="accent1">
+              <a:shade val="50000"/>
+            </a:schemeClr>
+          </a:lnRef>
+          <a:fillRef idx="1">
+            <a:schemeClr val="accent1"/>
+          </a:fillRef>
+          <a:effectRef idx="0">
+            <a:schemeClr val="accent1"/>
+          </a:effectRef>
+          <a:fontRef idx="minor">
+            <a:schemeClr val="lt1"/>
+          </a:fontRef>
+        </p:style>
+        <p:txBody>
+          <a:bodyPr rtlCol="0" anchor="ctr"/>
+          <a:lstStyle/>
+          <a:p>
+            <a:pPr algn="ctr"/>
+            <a:endParaRPr lang="en-US"/>
+          </a:p>
+        </p:txBody>
+      </p:sp>
+      <p:sp>
+        <p:nvSpPr>
+          <p:cNvPr id="2" name="Title 1">
+            <a:extLst>
+              <a:ext uri="{FF2B5EF4-FFF2-40B4-BE49-F238E27FC236}">
+                <a16:creationId xmlns:a16="http://schemas.microsoft.com/office/drawing/2014/main" id="{7ED8D95F-23B4-4986-B699-1E67C2E8C522}"/>
+              </a:ext>
+            </a:extLst>
+          </p:cNvPr>
+          <p:cNvSpPr>
+            <a:spLocks noGrp="1"/>
+          </p:cNvSpPr>
+          <p:nvPr>
+            <p:ph type="title"/>
+          </p:nvPr>
+        </p:nvSpPr>
+        <p:spPr>
+          <a:xfrm>
+            <a:off x="556532" y="643467"/>
+            <a:ext cx="11210925" cy="744836"/>
+          </a:xfrm>
+        </p:spPr>
+        <p:txBody>
+          <a:bodyPr vert="horz" lIns="91440" tIns="45720" rIns="91440" bIns="45720" rtlCol="0" anchor="ctr">
+            <a:normAutofit/>
+          </a:bodyPr>
+          <a:lstStyle/>
+          <a:p>
+            <a:pPr algn="ctr"/>
+            <a:r>
+              <a:rPr lang="en-US" sz="3200" dirty="0">
+                <a:solidFill>
+                  <a:schemeClr val="bg1"/>
+                </a:solidFill>
+              </a:rPr>
+              <a:t>Latest year available for poverty Indicators:</a:t>
+            </a:r>
+            <a:endParaRPr lang="en-US" sz="3200" kern="1200" dirty="0">
+              <a:solidFill>
+                <a:schemeClr val="bg1"/>
+              </a:solidFill>
+              <a:latin typeface="+mj-lt"/>
+              <a:ea typeface="+mj-ea"/>
+              <a:cs typeface="+mj-cs"/>
+            </a:endParaRPr>
+          </a:p>
+        </p:txBody>
+      </p:sp>
+    </p:spTree>
+    <p:extLst>
+      <p:ext uri="{BB962C8B-B14F-4D97-AF65-F5344CB8AC3E}">
+        <p14:creationId xmlns:p14="http://schemas.microsoft.com/office/powerpoint/2010/main" val="1904156910"/>
+      </p:ext>
+    </p:extLst>
+  </p:cSld>
+  <p:clrMapOvr>
+    <a:masterClrMapping/>
+  </p:clrMapOvr>
+</p:sld>
+</file>
+
+<file path=ppt/slides/slide18.xml><?xml version="1.0" encoding="utf-8"?>
+<p:sld xmlns:a="http://schemas.openxmlformats.org/drawingml/2006/main" xmlns:r="http://schemas.openxmlformats.org/officeDocument/2006/relationships" xmlns:p="http://schemas.openxmlformats.org/presentationml/2006/main">
+  <p:cSld>
+    <p:bg>
+      <p:bgPr>
+        <a:solidFill>
+          <a:schemeClr val="bg1"/>
+        </a:solidFill>
+        <a:effectLst/>
+      </p:bgPr>
+    </p:bg>
+    <p:spTree>
+      <p:nvGrpSpPr>
+        <p:cNvPr id="1" name=""/>
+        <p:cNvGrpSpPr/>
+        <p:nvPr/>
+      </p:nvGrpSpPr>
+      <p:grpSpPr>
+        <a:xfrm>
+          <a:off x="0" y="0"/>
+          <a:ext cx="0" cy="0"/>
+          <a:chOff x="0" y="0"/>
+          <a:chExt cx="0" cy="0"/>
+        </a:xfrm>
+      </p:grpSpPr>
+      <p:sp>
+        <p:nvSpPr>
+          <p:cNvPr id="16" name="Rectangle 15">
+            <a:extLst>
+              <a:ext uri="{FF2B5EF4-FFF2-40B4-BE49-F238E27FC236}">
+                <a16:creationId xmlns:a16="http://schemas.microsoft.com/office/drawing/2014/main" id="{A4AC5506-6312-4701-8D3C-40187889A947}"/>
+              </a:ext>
+              <a:ext uri="{C183D7F6-B498-43B3-948B-1728B52AA6E4}">
+                <adec:decorative xmlns:adec="http://schemas.microsoft.com/office/drawing/2017/decorative" val="1"/>
+              </a:ext>
+            </a:extLst>
+          </p:cNvPr>
+          <p:cNvSpPr>
+            <a:spLocks noGrp="1" noRot="1" noChangeAspect="1" noMove="1" noResize="1" noEditPoints="1" noAdjustHandles="1" noChangeArrowheads="1" noChangeShapeType="1" noTextEdit="1"/>
+          </p:cNvSpPr>
+          <p:nvPr>
+            <p:extLst>
+              <p:ext uri="{386F3935-93C4-4BCD-93E2-E3B085C9AB24}">
+                <p16:designElem xmlns:p16="http://schemas.microsoft.com/office/powerpoint/2015/main" val="1"/>
+              </p:ext>
+            </p:extLst>
+          </p:nvPr>
+        </p:nvSpPr>
+        <p:spPr>
+          <a:xfrm>
+            <a:off x="0" y="651752"/>
+            <a:ext cx="12192000" cy="736551"/>
+          </a:xfrm>
+          <a:prstGeom prst="rect">
+            <a:avLst/>
+          </a:prstGeom>
+          <a:solidFill>
+            <a:schemeClr val="tx1"/>
+          </a:solidFill>
+          <a:ln>
+            <a:noFill/>
+          </a:ln>
+        </p:spPr>
+        <p:style>
+          <a:lnRef idx="2">
+            <a:schemeClr val="accent1">
+              <a:shade val="50000"/>
+            </a:schemeClr>
+          </a:lnRef>
+          <a:fillRef idx="1">
+            <a:schemeClr val="accent1"/>
+          </a:fillRef>
+          <a:effectRef idx="0">
+            <a:schemeClr val="accent1"/>
+          </a:effectRef>
+          <a:fontRef idx="minor">
+            <a:schemeClr val="lt1"/>
+          </a:fontRef>
+        </p:style>
+        <p:txBody>
+          <a:bodyPr rtlCol="0" anchor="ctr"/>
+          <a:lstStyle/>
+          <a:p>
+            <a:pPr algn="ctr"/>
+            <a:endParaRPr lang="en-US"/>
+          </a:p>
+        </p:txBody>
+      </p:sp>
+      <p:sp>
+        <p:nvSpPr>
+          <p:cNvPr id="2" name="Title 1">
+            <a:extLst>
+              <a:ext uri="{FF2B5EF4-FFF2-40B4-BE49-F238E27FC236}">
+                <a16:creationId xmlns:a16="http://schemas.microsoft.com/office/drawing/2014/main" id="{7ED8D95F-23B4-4986-B699-1E67C2E8C522}"/>
+              </a:ext>
+            </a:extLst>
+          </p:cNvPr>
+          <p:cNvSpPr>
+            <a:spLocks noGrp="1"/>
+          </p:cNvSpPr>
+          <p:nvPr>
+            <p:ph type="title"/>
+          </p:nvPr>
+        </p:nvSpPr>
+        <p:spPr>
+          <a:xfrm>
+            <a:off x="556532" y="643467"/>
+            <a:ext cx="11210925" cy="744836"/>
+          </a:xfrm>
+        </p:spPr>
+        <p:txBody>
+          <a:bodyPr vert="horz" lIns="91440" tIns="45720" rIns="91440" bIns="45720" rtlCol="0" anchor="ctr">
+            <a:normAutofit/>
+          </a:bodyPr>
+          <a:lstStyle/>
+          <a:p>
+            <a:pPr algn="ctr"/>
+            <a:r>
+              <a:rPr lang="en-US" sz="3200" dirty="0">
+                <a:solidFill>
+                  <a:schemeClr val="bg1"/>
+                </a:solidFill>
+              </a:rPr>
+              <a:t>Latest year available for poverty Indicators:</a:t>
+            </a:r>
+            <a:endParaRPr lang="en-US" sz="3200" kern="1200" dirty="0">
+              <a:solidFill>
+                <a:schemeClr val="bg1"/>
+              </a:solidFill>
+              <a:latin typeface="+mj-lt"/>
+              <a:ea typeface="+mj-ea"/>
+              <a:cs typeface="+mj-cs"/>
+            </a:endParaRPr>
+          </a:p>
+        </p:txBody>
+      </p:sp>
+    </p:spTree>
+    <p:extLst>
+      <p:ext uri="{BB962C8B-B14F-4D97-AF65-F5344CB8AC3E}">
+        <p14:creationId xmlns:p14="http://schemas.microsoft.com/office/powerpoint/2010/main" val="2213640062"/>
+      </p:ext>
+    </p:extLst>
+  </p:cSld>
+  <p:clrMapOvr>
+    <a:masterClrMapping/>
+  </p:clrMapOvr>
+</p:sld>
+</file>
+
+<file path=ppt/slides/slide19.xml><?xml version="1.0" encoding="utf-8"?>
+<p:sld xmlns:a="http://schemas.openxmlformats.org/drawingml/2006/main" xmlns:r="http://schemas.openxmlformats.org/officeDocument/2006/relationships" xmlns:p="http://schemas.openxmlformats.org/presentationml/2006/main">
+  <p:cSld>
+    <p:bg>
+      <p:bgPr>
+        <a:gradFill rotWithShape="1">
+          <a:gsLst>
+            <a:gs pos="0">
+              <a:schemeClr val="bg1">
+                <a:tint val="93000"/>
+                <a:satMod val="150000"/>
+                <a:shade val="98000"/>
+                <a:lumMod val="102000"/>
+              </a:schemeClr>
+            </a:gs>
+            <a:gs pos="50000">
+              <a:schemeClr val="bg1">
+                <a:tint val="98000"/>
+                <a:satMod val="130000"/>
+                <a:shade val="90000"/>
+                <a:lumMod val="103000"/>
+              </a:schemeClr>
+            </a:gs>
+            <a:gs pos="100000">
+              <a:schemeClr val="bg1">
+                <a:shade val="63000"/>
+                <a:satMod val="120000"/>
+              </a:schemeClr>
+            </a:gs>
+          </a:gsLst>
+          <a:lin ang="5400000" scaled="0"/>
+        </a:gradFill>
+        <a:effectLst/>
+      </p:bgPr>
+    </p:bg>
+    <p:spTree>
+      <p:nvGrpSpPr>
+        <p:cNvPr id="1" name=""/>
+        <p:cNvGrpSpPr/>
+        <p:nvPr/>
+      </p:nvGrpSpPr>
+      <p:grpSpPr>
+        <a:xfrm>
+          <a:off x="0" y="0"/>
+          <a:ext cx="0" cy="0"/>
+          <a:chOff x="0" y="0"/>
+          <a:chExt cx="0" cy="0"/>
+        </a:xfrm>
+      </p:grpSpPr>
+      <p:pic>
+        <p:nvPicPr>
+          <p:cNvPr id="4" name="Picture 3" descr="A close up of a map&#10;&#10;Description generated with very high confidence">
+            <a:hlinkClick r:id="rId2"/>
+            <a:extLst>
+              <a:ext uri="{FF2B5EF4-FFF2-40B4-BE49-F238E27FC236}">
+                <a16:creationId xmlns:a16="http://schemas.microsoft.com/office/drawing/2014/main" id="{B14EA926-F889-4E0B-8DA5-BBA87EED988A}"/>
+              </a:ext>
+            </a:extLst>
+          </p:cNvPr>
+          <p:cNvPicPr>
+            <a:picLocks noChangeAspect="1"/>
+          </p:cNvPicPr>
+          <p:nvPr/>
+        </p:nvPicPr>
+        <p:blipFill rotWithShape="1">
+          <a:blip r:embed="rId3"/>
+          <a:srcRect t="2445" r="1" b="1"/>
+          <a:stretch/>
+        </p:blipFill>
+        <p:spPr>
+          <a:xfrm rot="21480000">
+            <a:off x="1445273" y="1714901"/>
+            <a:ext cx="9301457" cy="4468976"/>
+          </a:xfrm>
+          <a:prstGeom prst="rect">
+            <a:avLst/>
+          </a:prstGeom>
+        </p:spPr>
+      </p:pic>
+      <p:sp>
+        <p:nvSpPr>
+          <p:cNvPr id="5" name="Title 4">
+            <a:extLst>
+              <a:ext uri="{FF2B5EF4-FFF2-40B4-BE49-F238E27FC236}">
+                <a16:creationId xmlns:a16="http://schemas.microsoft.com/office/drawing/2014/main" id="{4E2AA3BB-28D8-4B7E-923F-730ADCC998C9}"/>
+              </a:ext>
+            </a:extLst>
+          </p:cNvPr>
+          <p:cNvSpPr>
+            <a:spLocks noGrp="1"/>
+          </p:cNvSpPr>
+          <p:nvPr>
+            <p:ph type="title"/>
+          </p:nvPr>
+        </p:nvSpPr>
+        <p:spPr/>
+        <p:txBody>
+          <a:bodyPr/>
+          <a:lstStyle/>
+          <a:p>
+            <a:r>
+              <a:rPr lang="en-US" dirty="0"/>
+              <a:t>Indicator Availability Dashboard </a:t>
+            </a:r>
+          </a:p>
+        </p:txBody>
+      </p:sp>
+      <p:pic>
+        <p:nvPicPr>
+          <p:cNvPr id="8" name="Content Placeholder 7" descr="Share">
+            <a:hlinkClick r:id="rId2"/>
+            <a:extLst>
+              <a:ext uri="{FF2B5EF4-FFF2-40B4-BE49-F238E27FC236}">
+                <a16:creationId xmlns:a16="http://schemas.microsoft.com/office/drawing/2014/main" id="{80BA8D5E-8372-4C73-98BF-A28BBDADD85A}"/>
+              </a:ext>
+            </a:extLst>
+          </p:cNvPr>
+          <p:cNvPicPr>
+            <a:picLocks noGrp="1" noChangeAspect="1"/>
+          </p:cNvPicPr>
+          <p:nvPr>
+            <p:ph idx="1"/>
+          </p:nvPr>
+        </p:nvPicPr>
+        <p:blipFill>
+          <a:blip r:embed="rId4">
+            <a:extLst>
+              <a:ext uri="{28A0092B-C50C-407E-A947-70E740481C1C}">
+                <a14:useLocalDpi xmlns:a14="http://schemas.microsoft.com/office/drawing/2010/main" val="0"/>
+              </a:ext>
+              <a:ext uri="{96DAC541-7B7A-43D3-8B79-37D633B846F1}">
+                <asvg:svgBlip xmlns:asvg="http://schemas.microsoft.com/office/drawing/2016/SVG/main" r:embed="rId5"/>
+              </a:ext>
+            </a:extLst>
+          </a:blip>
+          <a:stretch>
+            <a:fillRect/>
+          </a:stretch>
+        </p:blipFill>
+        <p:spPr>
+          <a:xfrm>
+            <a:off x="8486686" y="570706"/>
+            <a:ext cx="914400" cy="914400"/>
+          </a:xfrm>
+        </p:spPr>
+      </p:pic>
+      <p:sp>
+        <p:nvSpPr>
+          <p:cNvPr id="10" name="Rectangle 9">
+            <a:extLst>
+              <a:ext uri="{FF2B5EF4-FFF2-40B4-BE49-F238E27FC236}">
+                <a16:creationId xmlns:a16="http://schemas.microsoft.com/office/drawing/2014/main" id="{1310878D-09A6-4465-9598-57395F5A9A20}"/>
+              </a:ext>
+            </a:extLst>
+          </p:cNvPr>
+          <p:cNvSpPr/>
+          <p:nvPr/>
+        </p:nvSpPr>
+        <p:spPr>
+          <a:xfrm>
+            <a:off x="9464892" y="6287294"/>
+            <a:ext cx="2254015" cy="369332"/>
+          </a:xfrm>
+          <a:prstGeom prst="rect">
+            <a:avLst/>
+          </a:prstGeom>
+        </p:spPr>
+        <p:txBody>
+          <a:bodyPr wrap="none">
+            <a:spAutoFit/>
+          </a:bodyPr>
+          <a:lstStyle/>
+          <a:p>
+            <a:r>
+              <a:rPr lang="en-US" dirty="0">
+                <a:hlinkClick r:id="rId2"/>
+              </a:rPr>
+              <a:t>http://arcg.is/1jq0n9</a:t>
+            </a:r>
+            <a:r>
+              <a:rPr lang="en-US" dirty="0"/>
+              <a:t>  </a:t>
+            </a:r>
+          </a:p>
+        </p:txBody>
+      </p:sp>
+    </p:spTree>
+    <p:extLst>
+      <p:ext uri="{BB962C8B-B14F-4D97-AF65-F5344CB8AC3E}">
+        <p14:creationId xmlns:p14="http://schemas.microsoft.com/office/powerpoint/2010/main" val="3149021349"/>
       </p:ext>
     </p:extLst>
   </p:cSld>
@@ -6023,10 +8136,10 @@
       </p:sp>
       <p:pic>
         <p:nvPicPr>
-          <p:cNvPr id="3" name="Picture 2">
-            <a:extLst>
-              <a:ext uri="{FF2B5EF4-FFF2-40B4-BE49-F238E27FC236}">
-                <a16:creationId xmlns:a16="http://schemas.microsoft.com/office/drawing/2014/main" id="{2F9A36B5-9C50-4C83-830E-7367DE0562FA}"/>
+          <p:cNvPr id="6" name="Graphic 5">
+            <a:extLst>
+              <a:ext uri="{FF2B5EF4-FFF2-40B4-BE49-F238E27FC236}">
+                <a16:creationId xmlns:a16="http://schemas.microsoft.com/office/drawing/2014/main" id="{3F64F720-5F6C-47BC-A27E-BA46F684A253}"/>
               </a:ext>
             </a:extLst>
           </p:cNvPr>
@@ -6036,104 +8149,34 @@
           <p:nvPr/>
         </p:nvPicPr>
         <p:blipFill>
-          <a:blip r:embed="rId2"/>
+          <a:blip r:embed="rId2">
+            <a:extLst>
+              <a:ext uri="{28A0092B-C50C-407E-A947-70E740481C1C}">
+                <a14:useLocalDpi xmlns:a14="http://schemas.microsoft.com/office/drawing/2010/main" val="0"/>
+              </a:ext>
+              <a:ext uri="{96DAC541-7B7A-43D3-8B79-37D633B846F1}">
+                <asvg:svgBlip xmlns:asvg="http://schemas.microsoft.com/office/drawing/2016/SVG/main" r:embed="rId3"/>
+              </a:ext>
+            </a:extLst>
+          </a:blip>
           <a:stretch>
             <a:fillRect/>
           </a:stretch>
         </p:blipFill>
         <p:spPr>
           <a:xfrm>
-            <a:off x="1981200" y="1684656"/>
-            <a:ext cx="8229600" cy="5198981"/>
+            <a:off x="2740152" y="1600200"/>
+            <a:ext cx="6705600" cy="5029200"/>
           </a:xfrm>
           <a:prstGeom prst="rect">
             <a:avLst/>
           </a:prstGeom>
         </p:spPr>
       </p:pic>
-      <p:sp>
-        <p:nvSpPr>
-          <p:cNvPr id="4" name="TextBox 3">
-            <a:extLst>
-              <a:ext uri="{FF2B5EF4-FFF2-40B4-BE49-F238E27FC236}">
-                <a16:creationId xmlns:a16="http://schemas.microsoft.com/office/drawing/2014/main" id="{68C77C27-C6F3-413A-97E6-33DE9B81A442}"/>
-              </a:ext>
-            </a:extLst>
-          </p:cNvPr>
-          <p:cNvSpPr txBox="1"/>
-          <p:nvPr/>
-        </p:nvSpPr>
-        <p:spPr>
-          <a:xfrm>
-            <a:off x="9577699" y="5804236"/>
-            <a:ext cx="914400" cy="338554"/>
-          </a:xfrm>
-          <a:prstGeom prst="rect">
-            <a:avLst/>
-          </a:prstGeom>
-          <a:noFill/>
-        </p:spPr>
-        <p:txBody>
-          <a:bodyPr wrap="square" rtlCol="0">
-            <a:spAutoFit/>
-          </a:bodyPr>
-          <a:lstStyle/>
-          <a:p>
-            <a:r>
-              <a:rPr lang="en-US" sz="1600" dirty="0"/>
-              <a:t>2017</a:t>
-            </a:r>
-          </a:p>
-        </p:txBody>
-      </p:sp>
-      <p:cxnSp>
-        <p:nvCxnSpPr>
-          <p:cNvPr id="6" name="Connector: Elbow 5">
-            <a:extLst>
-              <a:ext uri="{FF2B5EF4-FFF2-40B4-BE49-F238E27FC236}">
-                <a16:creationId xmlns:a16="http://schemas.microsoft.com/office/drawing/2014/main" id="{4ED8B5BB-33CB-4CF4-997D-1EFDC66EE0B6}"/>
-              </a:ext>
-            </a:extLst>
-          </p:cNvPr>
-          <p:cNvCxnSpPr/>
-          <p:nvPr/>
-        </p:nvCxnSpPr>
-        <p:spPr>
-          <a:xfrm rot="10800000">
-            <a:off x="9426012" y="5836779"/>
-            <a:ext cx="222191" cy="136733"/>
-          </a:xfrm>
-          <a:prstGeom prst="bentConnector3">
-            <a:avLst>
-              <a:gd name="adj1" fmla="val 96154"/>
-            </a:avLst>
-          </a:prstGeom>
-          <a:ln>
-            <a:solidFill>
-              <a:schemeClr val="tx1"/>
-            </a:solidFill>
-            <a:tailEnd type="triangle"/>
-          </a:ln>
-        </p:spPr>
-        <p:style>
-          <a:lnRef idx="1">
-            <a:schemeClr val="accent1"/>
-          </a:lnRef>
-          <a:fillRef idx="0">
-            <a:schemeClr val="accent1"/>
-          </a:fillRef>
-          <a:effectRef idx="0">
-            <a:schemeClr val="accent1"/>
-          </a:effectRef>
-          <a:fontRef idx="minor">
-            <a:schemeClr val="tx1"/>
-          </a:fontRef>
-        </p:style>
-      </p:cxnSp>
     </p:spTree>
     <p:extLst>
       <p:ext uri="{BB962C8B-B14F-4D97-AF65-F5344CB8AC3E}">
-        <p14:creationId xmlns:p14="http://schemas.microsoft.com/office/powerpoint/2010/main" val="3716473134"/>
+        <p14:creationId xmlns:p14="http://schemas.microsoft.com/office/powerpoint/2010/main" val="2419076774"/>
       </p:ext>
     </p:extLst>
   </p:cSld>
@@ -6281,10 +8324,10 @@
       </p:sp>
       <p:pic>
         <p:nvPicPr>
-          <p:cNvPr id="3" name="Picture 2">
-            <a:extLst>
-              <a:ext uri="{FF2B5EF4-FFF2-40B4-BE49-F238E27FC236}">
-                <a16:creationId xmlns:a16="http://schemas.microsoft.com/office/drawing/2014/main" id="{625AF3CE-3539-4DE7-A4A7-AFF18F9CDCB7}"/>
+          <p:cNvPr id="4" name="Graphic 3">
+            <a:extLst>
+              <a:ext uri="{FF2B5EF4-FFF2-40B4-BE49-F238E27FC236}">
+                <a16:creationId xmlns:a16="http://schemas.microsoft.com/office/drawing/2014/main" id="{0E7F7D4D-9735-439C-91EB-129A6AC90039}"/>
               </a:ext>
             </a:extLst>
           </p:cNvPr>
@@ -6294,104 +8337,34 @@
           <p:nvPr/>
         </p:nvPicPr>
         <p:blipFill>
-          <a:blip r:embed="rId2"/>
+          <a:blip r:embed="rId2">
+            <a:extLst>
+              <a:ext uri="{28A0092B-C50C-407E-A947-70E740481C1C}">
+                <a14:useLocalDpi xmlns:a14="http://schemas.microsoft.com/office/drawing/2010/main" val="0"/>
+              </a:ext>
+              <a:ext uri="{96DAC541-7B7A-43D3-8B79-37D633B846F1}">
+                <asvg:svgBlip xmlns:asvg="http://schemas.microsoft.com/office/drawing/2016/SVG/main" r:embed="rId3"/>
+              </a:ext>
+            </a:extLst>
+          </a:blip>
           <a:stretch>
             <a:fillRect/>
           </a:stretch>
         </p:blipFill>
         <p:spPr>
           <a:xfrm>
-            <a:off x="1981200" y="1684656"/>
-            <a:ext cx="8229600" cy="5198981"/>
+            <a:off x="2740152" y="1600200"/>
+            <a:ext cx="6705600" cy="5029200"/>
           </a:xfrm>
           <a:prstGeom prst="rect">
             <a:avLst/>
           </a:prstGeom>
         </p:spPr>
       </p:pic>
-      <p:sp>
-        <p:nvSpPr>
-          <p:cNvPr id="5" name="TextBox 4">
-            <a:extLst>
-              <a:ext uri="{FF2B5EF4-FFF2-40B4-BE49-F238E27FC236}">
-                <a16:creationId xmlns:a16="http://schemas.microsoft.com/office/drawing/2014/main" id="{C744D768-E425-4B20-BB2A-3CB548FE1332}"/>
-              </a:ext>
-            </a:extLst>
-          </p:cNvPr>
-          <p:cNvSpPr txBox="1"/>
-          <p:nvPr/>
-        </p:nvSpPr>
-        <p:spPr>
-          <a:xfrm>
-            <a:off x="9577699" y="5804236"/>
-            <a:ext cx="914400" cy="338554"/>
-          </a:xfrm>
-          <a:prstGeom prst="rect">
-            <a:avLst/>
-          </a:prstGeom>
-          <a:noFill/>
-        </p:spPr>
-        <p:txBody>
-          <a:bodyPr wrap="square" rtlCol="0">
-            <a:spAutoFit/>
-          </a:bodyPr>
-          <a:lstStyle/>
-          <a:p>
-            <a:r>
-              <a:rPr lang="en-US" sz="1600" dirty="0"/>
-              <a:t>2017</a:t>
-            </a:r>
-          </a:p>
-        </p:txBody>
-      </p:sp>
-      <p:cxnSp>
-        <p:nvCxnSpPr>
-          <p:cNvPr id="6" name="Connector: Elbow 5">
-            <a:extLst>
-              <a:ext uri="{FF2B5EF4-FFF2-40B4-BE49-F238E27FC236}">
-                <a16:creationId xmlns:a16="http://schemas.microsoft.com/office/drawing/2014/main" id="{3A9C3E48-25A9-4F16-A9B7-45CBF7CA86BD}"/>
-              </a:ext>
-            </a:extLst>
-          </p:cNvPr>
-          <p:cNvCxnSpPr/>
-          <p:nvPr/>
-        </p:nvCxnSpPr>
-        <p:spPr>
-          <a:xfrm rot="10800000">
-            <a:off x="9426012" y="5836779"/>
-            <a:ext cx="222191" cy="136733"/>
-          </a:xfrm>
-          <a:prstGeom prst="bentConnector3">
-            <a:avLst>
-              <a:gd name="adj1" fmla="val 96154"/>
-            </a:avLst>
-          </a:prstGeom>
-          <a:ln>
-            <a:solidFill>
-              <a:schemeClr val="tx1"/>
-            </a:solidFill>
-            <a:tailEnd type="triangle"/>
-          </a:ln>
-        </p:spPr>
-        <p:style>
-          <a:lnRef idx="1">
-            <a:schemeClr val="accent1"/>
-          </a:lnRef>
-          <a:fillRef idx="0">
-            <a:schemeClr val="accent1"/>
-          </a:fillRef>
-          <a:effectRef idx="0">
-            <a:schemeClr val="accent1"/>
-          </a:effectRef>
-          <a:fontRef idx="minor">
-            <a:schemeClr val="tx1"/>
-          </a:fontRef>
-        </p:style>
-      </p:cxnSp>
     </p:spTree>
     <p:extLst>
       <p:ext uri="{BB962C8B-B14F-4D97-AF65-F5344CB8AC3E}">
-        <p14:creationId xmlns:p14="http://schemas.microsoft.com/office/powerpoint/2010/main" val="1674515983"/>
+        <p14:creationId xmlns:p14="http://schemas.microsoft.com/office/powerpoint/2010/main" val="2649136025"/>
       </p:ext>
     </p:extLst>
   </p:cSld>
@@ -6406,33 +8379,9 @@
   <p:cSld>
     <p:bg>
       <p:bgPr>
-        <a:gradFill rotWithShape="1">
-          <a:gsLst>
-            <a:gs pos="0">
-              <a:schemeClr val="bg1">
-                <a:tint val="93000"/>
-                <a:satMod val="150000"/>
-                <a:shade val="98000"/>
-                <a:lumMod val="102000"/>
-              </a:schemeClr>
-            </a:gs>
-            <a:gs pos="50000">
-              <a:schemeClr val="bg1">
-                <a:tint val="98000"/>
-                <a:satMod val="130000"/>
-                <a:shade val="90000"/>
-                <a:lumMod val="103000"/>
-              </a:schemeClr>
-            </a:gs>
-            <a:gs pos="100000">
-              <a:schemeClr val="bg1">
-                <a:shade val="63000"/>
-                <a:satMod val="120000"/>
-              </a:schemeClr>
-            </a:gs>
-          </a:gsLst>
-          <a:lin ang="5400000" scaled="0"/>
-        </a:gradFill>
+        <a:solidFill>
+          <a:schemeClr val="bg1"/>
+        </a:solidFill>
         <a:effectLst/>
       </p:bgPr>
     </p:bg>
@@ -6450,13 +8399,123 @@
           <a:chExt cx="0" cy="0"/>
         </a:xfrm>
       </p:grpSpPr>
+      <p:sp>
+        <p:nvSpPr>
+          <p:cNvPr id="16" name="Rectangle 15">
+            <a:extLst>
+              <a:ext uri="{FF2B5EF4-FFF2-40B4-BE49-F238E27FC236}">
+                <a16:creationId xmlns:a16="http://schemas.microsoft.com/office/drawing/2014/main" id="{A4AC5506-6312-4701-8D3C-40187889A947}"/>
+              </a:ext>
+              <a:ext uri="{C183D7F6-B498-43B3-948B-1728B52AA6E4}">
+                <adec:decorative xmlns:adec="http://schemas.microsoft.com/office/drawing/2017/decorative" val="1"/>
+              </a:ext>
+            </a:extLst>
+          </p:cNvPr>
+          <p:cNvSpPr>
+            <a:spLocks noGrp="1" noRot="1" noChangeAspect="1" noMove="1" noResize="1" noEditPoints="1" noAdjustHandles="1" noChangeArrowheads="1" noChangeShapeType="1" noTextEdit="1"/>
+          </p:cNvSpPr>
+          <p:nvPr>
+            <p:extLst>
+              <p:ext uri="{386F3935-93C4-4BCD-93E2-E3B085C9AB24}">
+                <p16:designElem xmlns:p16="http://schemas.microsoft.com/office/powerpoint/2015/main" val="1"/>
+              </p:ext>
+            </p:extLst>
+          </p:nvPr>
+        </p:nvSpPr>
+        <p:spPr>
+          <a:xfrm>
+            <a:off x="0" y="651752"/>
+            <a:ext cx="12192000" cy="736551"/>
+          </a:xfrm>
+          <a:prstGeom prst="rect">
+            <a:avLst/>
+          </a:prstGeom>
+          <a:solidFill>
+            <a:schemeClr val="tx1"/>
+          </a:solidFill>
+          <a:ln>
+            <a:noFill/>
+          </a:ln>
+        </p:spPr>
+        <p:style>
+          <a:lnRef idx="2">
+            <a:schemeClr val="accent1">
+              <a:shade val="50000"/>
+            </a:schemeClr>
+          </a:lnRef>
+          <a:fillRef idx="1">
+            <a:schemeClr val="accent1"/>
+          </a:fillRef>
+          <a:effectRef idx="0">
+            <a:schemeClr val="accent1"/>
+          </a:effectRef>
+          <a:fontRef idx="minor">
+            <a:schemeClr val="lt1"/>
+          </a:fontRef>
+        </p:style>
+        <p:txBody>
+          <a:bodyPr rtlCol="0" anchor="ctr"/>
+          <a:lstStyle/>
+          <a:p>
+            <a:pPr algn="ctr"/>
+            <a:endParaRPr lang="en-US"/>
+          </a:p>
+        </p:txBody>
+      </p:sp>
+      <p:sp>
+        <p:nvSpPr>
+          <p:cNvPr id="2" name="Title 1">
+            <a:extLst>
+              <a:ext uri="{FF2B5EF4-FFF2-40B4-BE49-F238E27FC236}">
+                <a16:creationId xmlns:a16="http://schemas.microsoft.com/office/drawing/2014/main" id="{7ED8D95F-23B4-4986-B699-1E67C2E8C522}"/>
+              </a:ext>
+            </a:extLst>
+          </p:cNvPr>
+          <p:cNvSpPr>
+            <a:spLocks noGrp="1"/>
+          </p:cNvSpPr>
+          <p:nvPr>
+            <p:ph type="title"/>
+          </p:nvPr>
+        </p:nvSpPr>
+        <p:spPr>
+          <a:xfrm>
+            <a:off x="556532" y="643467"/>
+            <a:ext cx="11210925" cy="744836"/>
+          </a:xfrm>
+        </p:spPr>
+        <p:txBody>
+          <a:bodyPr vert="horz" lIns="91440" tIns="45720" rIns="91440" bIns="45720" rtlCol="0" anchor="ctr">
+            <a:normAutofit/>
+          </a:bodyPr>
+          <a:lstStyle/>
+          <a:p>
+            <a:pPr algn="ctr"/>
+            <a:r>
+              <a:rPr lang="en-US" sz="3200" dirty="0">
+                <a:solidFill>
+                  <a:schemeClr val="bg1"/>
+                </a:solidFill>
+              </a:rPr>
+              <a:t>Latest year available for poverty Indicators:</a:t>
+            </a:r>
+            <a:endParaRPr lang="en-US" sz="3200" kern="1200" dirty="0">
+              <a:solidFill>
+                <a:schemeClr val="bg1"/>
+              </a:solidFill>
+              <a:latin typeface="+mj-lt"/>
+              <a:ea typeface="+mj-ea"/>
+              <a:cs typeface="+mj-cs"/>
+            </a:endParaRPr>
+          </a:p>
+        </p:txBody>
+      </p:sp>
       <p:pic>
         <p:nvPicPr>
-          <p:cNvPr id="4" name="Picture 3" descr="A close up of a map&#10;&#10;Description generated with very high confidence">
-            <a:hlinkClick r:id="rId2"/>
-            <a:extLst>
-              <a:ext uri="{FF2B5EF4-FFF2-40B4-BE49-F238E27FC236}">
-                <a16:creationId xmlns:a16="http://schemas.microsoft.com/office/drawing/2014/main" id="{B14EA926-F889-4E0B-8DA5-BBA87EED988A}"/>
+          <p:cNvPr id="4" name="Graphic 3">
+            <a:extLst>
+              <a:ext uri="{FF2B5EF4-FFF2-40B4-BE49-F238E27FC236}">
+                <a16:creationId xmlns:a16="http://schemas.microsoft.com/office/drawing/2014/main" id="{D71B252D-714B-46D3-94A9-450F1D7FBE08}"/>
               </a:ext>
             </a:extLst>
           </p:cNvPr>
@@ -6465,74 +8524,14 @@
           </p:cNvPicPr>
           <p:nvPr/>
         </p:nvPicPr>
-        <p:blipFill rotWithShape="1">
-          <a:blip r:embed="rId3"/>
-          <a:srcRect t="2445" r="1" b="1"/>
-          <a:stretch/>
-        </p:blipFill>
-        <p:spPr>
-          <a:xfrm rot="21480000">
-            <a:off x="1445273" y="1714901"/>
-            <a:ext cx="9301457" cy="4468976"/>
-          </a:xfrm>
-          <a:prstGeom prst="rect">
-            <a:avLst/>
-          </a:prstGeom>
-        </p:spPr>
-      </p:pic>
-      <p:sp>
-        <p:nvSpPr>
-          <p:cNvPr id="5" name="Title 4">
-            <a:extLst>
-              <a:ext uri="{FF2B5EF4-FFF2-40B4-BE49-F238E27FC236}">
-                <a16:creationId xmlns:a16="http://schemas.microsoft.com/office/drawing/2014/main" id="{4E2AA3BB-28D8-4B7E-923F-730ADCC998C9}"/>
-              </a:ext>
-            </a:extLst>
-          </p:cNvPr>
-          <p:cNvSpPr>
-            <a:spLocks noGrp="1"/>
-          </p:cNvSpPr>
-          <p:nvPr>
-            <p:ph type="title"/>
-          </p:nvPr>
-        </p:nvSpPr>
-        <p:spPr/>
-        <p:txBody>
-          <a:bodyPr/>
-          <a:lstStyle/>
-          <a:p>
-            <a:r>
-              <a:rPr lang="en-US" dirty="0"/>
-              <a:t>Indicator Availability Dashboard </a:t>
-            </a:r>
-          </a:p>
-        </p:txBody>
-      </p:sp>
-      <p:pic>
-        <p:nvPicPr>
-          <p:cNvPr id="8" name="Content Placeholder 7" descr="Share">
-            <a:hlinkClick r:id="rId2"/>
-            <a:extLst>
-              <a:ext uri="{FF2B5EF4-FFF2-40B4-BE49-F238E27FC236}">
-                <a16:creationId xmlns:a16="http://schemas.microsoft.com/office/drawing/2014/main" id="{80BA8D5E-8372-4C73-98BF-A28BBDADD85A}"/>
-              </a:ext>
-            </a:extLst>
-          </p:cNvPr>
-          <p:cNvPicPr>
-            <a:picLocks noGrp="1" noChangeAspect="1"/>
-          </p:cNvPicPr>
-          <p:nvPr>
-            <p:ph idx="1"/>
-          </p:nvPr>
-        </p:nvPicPr>
         <p:blipFill>
-          <a:blip r:embed="rId4">
+          <a:blip r:embed="rId2">
             <a:extLst>
               <a:ext uri="{28A0092B-C50C-407E-A947-70E740481C1C}">
                 <a14:useLocalDpi xmlns:a14="http://schemas.microsoft.com/office/drawing/2010/main" val="0"/>
               </a:ext>
               <a:ext uri="{96DAC541-7B7A-43D3-8B79-37D633B846F1}">
-                <asvg:svgBlip xmlns:asvg="http://schemas.microsoft.com/office/drawing/2016/SVG/main" r:embed="rId5"/>
+                <asvg:svgBlip xmlns:asvg="http://schemas.microsoft.com/office/drawing/2016/SVG/main" r:embed="rId3"/>
               </a:ext>
             </a:extLst>
           </a:blip>
@@ -6542,55 +8541,770 @@
         </p:blipFill>
         <p:spPr>
           <a:xfrm>
-            <a:off x="8486686" y="570706"/>
-            <a:ext cx="914400" cy="914400"/>
-          </a:xfrm>
-        </p:spPr>
-      </p:pic>
-      <p:sp>
-        <p:nvSpPr>
-          <p:cNvPr id="10" name="Rectangle 9">
-            <a:extLst>
-              <a:ext uri="{FF2B5EF4-FFF2-40B4-BE49-F238E27FC236}">
-                <a16:creationId xmlns:a16="http://schemas.microsoft.com/office/drawing/2014/main" id="{1310878D-09A6-4465-9598-57395F5A9A20}"/>
-              </a:ext>
-            </a:extLst>
-          </p:cNvPr>
-          <p:cNvSpPr/>
-          <p:nvPr/>
-        </p:nvSpPr>
-        <p:spPr>
-          <a:xfrm>
-            <a:off x="9464892" y="6287294"/>
-            <a:ext cx="2254015" cy="369332"/>
+            <a:off x="2740152" y="1600200"/>
+            <a:ext cx="6705600" cy="5029200"/>
           </a:xfrm>
           <a:prstGeom prst="rect">
             <a:avLst/>
           </a:prstGeom>
         </p:spPr>
-        <p:txBody>
-          <a:bodyPr wrap="none">
-            <a:spAutoFit/>
-          </a:bodyPr>
-          <a:lstStyle/>
-          <a:p>
-            <a:r>
-              <a:rPr lang="en-US" dirty="0">
-                <a:hlinkClick r:id="rId2"/>
-              </a:rPr>
-              <a:t>http://arcg.is/1jq0n9</a:t>
-            </a:r>
-            <a:r>
-              <a:rPr lang="en-US" dirty="0"/>
-              <a:t>  </a:t>
-            </a:r>
-          </a:p>
-        </p:txBody>
-      </p:sp>
+      </p:pic>
     </p:spTree>
     <p:extLst>
       <p:ext uri="{BB962C8B-B14F-4D97-AF65-F5344CB8AC3E}">
-        <p14:creationId xmlns:p14="http://schemas.microsoft.com/office/powerpoint/2010/main" val="3149021349"/>
+        <p14:creationId xmlns:p14="http://schemas.microsoft.com/office/powerpoint/2010/main" val="3511115641"/>
+      </p:ext>
+    </p:extLst>
+  </p:cSld>
+  <p:clrMapOvr>
+    <a:masterClrMapping/>
+  </p:clrMapOvr>
+</p:sld>
+</file>
+
+<file path=ppt/slides/slide6.xml><?xml version="1.0" encoding="utf-8"?>
+<p:sld xmlns:a="http://schemas.openxmlformats.org/drawingml/2006/main" xmlns:r="http://schemas.openxmlformats.org/officeDocument/2006/relationships" xmlns:p="http://schemas.openxmlformats.org/presentationml/2006/main">
+  <p:cSld>
+    <p:bg>
+      <p:bgPr>
+        <a:solidFill>
+          <a:schemeClr val="bg1"/>
+        </a:solidFill>
+        <a:effectLst/>
+      </p:bgPr>
+    </p:bg>
+    <p:spTree>
+      <p:nvGrpSpPr>
+        <p:cNvPr id="1" name=""/>
+        <p:cNvGrpSpPr/>
+        <p:nvPr/>
+      </p:nvGrpSpPr>
+      <p:grpSpPr>
+        <a:xfrm>
+          <a:off x="0" y="0"/>
+          <a:ext cx="0" cy="0"/>
+          <a:chOff x="0" y="0"/>
+          <a:chExt cx="0" cy="0"/>
+        </a:xfrm>
+      </p:grpSpPr>
+      <p:sp>
+        <p:nvSpPr>
+          <p:cNvPr id="16" name="Rectangle 15">
+            <a:extLst>
+              <a:ext uri="{FF2B5EF4-FFF2-40B4-BE49-F238E27FC236}">
+                <a16:creationId xmlns:a16="http://schemas.microsoft.com/office/drawing/2014/main" id="{A4AC5506-6312-4701-8D3C-40187889A947}"/>
+              </a:ext>
+              <a:ext uri="{C183D7F6-B498-43B3-948B-1728B52AA6E4}">
+                <adec:decorative xmlns:adec="http://schemas.microsoft.com/office/drawing/2017/decorative" val="1"/>
+              </a:ext>
+            </a:extLst>
+          </p:cNvPr>
+          <p:cNvSpPr>
+            <a:spLocks noGrp="1" noRot="1" noChangeAspect="1" noMove="1" noResize="1" noEditPoints="1" noAdjustHandles="1" noChangeArrowheads="1" noChangeShapeType="1" noTextEdit="1"/>
+          </p:cNvSpPr>
+          <p:nvPr>
+            <p:extLst>
+              <p:ext uri="{386F3935-93C4-4BCD-93E2-E3B085C9AB24}">
+                <p16:designElem xmlns:p16="http://schemas.microsoft.com/office/powerpoint/2015/main" val="1"/>
+              </p:ext>
+            </p:extLst>
+          </p:nvPr>
+        </p:nvSpPr>
+        <p:spPr>
+          <a:xfrm>
+            <a:off x="0" y="651752"/>
+            <a:ext cx="12192000" cy="736551"/>
+          </a:xfrm>
+          <a:prstGeom prst="rect">
+            <a:avLst/>
+          </a:prstGeom>
+          <a:solidFill>
+            <a:schemeClr val="tx1"/>
+          </a:solidFill>
+          <a:ln>
+            <a:noFill/>
+          </a:ln>
+        </p:spPr>
+        <p:style>
+          <a:lnRef idx="2">
+            <a:schemeClr val="accent1">
+              <a:shade val="50000"/>
+            </a:schemeClr>
+          </a:lnRef>
+          <a:fillRef idx="1">
+            <a:schemeClr val="accent1"/>
+          </a:fillRef>
+          <a:effectRef idx="0">
+            <a:schemeClr val="accent1"/>
+          </a:effectRef>
+          <a:fontRef idx="minor">
+            <a:schemeClr val="lt1"/>
+          </a:fontRef>
+        </p:style>
+        <p:txBody>
+          <a:bodyPr rtlCol="0" anchor="ctr"/>
+          <a:lstStyle/>
+          <a:p>
+            <a:pPr algn="ctr"/>
+            <a:endParaRPr lang="en-US"/>
+          </a:p>
+        </p:txBody>
+      </p:sp>
+      <p:sp>
+        <p:nvSpPr>
+          <p:cNvPr id="2" name="Title 1">
+            <a:extLst>
+              <a:ext uri="{FF2B5EF4-FFF2-40B4-BE49-F238E27FC236}">
+                <a16:creationId xmlns:a16="http://schemas.microsoft.com/office/drawing/2014/main" id="{7ED8D95F-23B4-4986-B699-1E67C2E8C522}"/>
+              </a:ext>
+            </a:extLst>
+          </p:cNvPr>
+          <p:cNvSpPr>
+            <a:spLocks noGrp="1"/>
+          </p:cNvSpPr>
+          <p:nvPr>
+            <p:ph type="title"/>
+          </p:nvPr>
+        </p:nvSpPr>
+        <p:spPr>
+          <a:xfrm>
+            <a:off x="556532" y="643467"/>
+            <a:ext cx="11210925" cy="744836"/>
+          </a:xfrm>
+        </p:spPr>
+        <p:txBody>
+          <a:bodyPr vert="horz" lIns="91440" tIns="45720" rIns="91440" bIns="45720" rtlCol="0" anchor="ctr">
+            <a:normAutofit/>
+          </a:bodyPr>
+          <a:lstStyle/>
+          <a:p>
+            <a:pPr algn="ctr"/>
+            <a:r>
+              <a:rPr lang="en-US" sz="3200" dirty="0">
+                <a:solidFill>
+                  <a:schemeClr val="bg1"/>
+                </a:solidFill>
+              </a:rPr>
+              <a:t>Latest year available for poverty Indicators:</a:t>
+            </a:r>
+            <a:endParaRPr lang="en-US" sz="3200" kern="1200" dirty="0">
+              <a:solidFill>
+                <a:schemeClr val="bg1"/>
+              </a:solidFill>
+              <a:latin typeface="+mj-lt"/>
+              <a:ea typeface="+mj-ea"/>
+              <a:cs typeface="+mj-cs"/>
+            </a:endParaRPr>
+          </a:p>
+        </p:txBody>
+      </p:sp>
+      <p:pic>
+        <p:nvPicPr>
+          <p:cNvPr id="4" name="Graphic 3">
+            <a:extLst>
+              <a:ext uri="{FF2B5EF4-FFF2-40B4-BE49-F238E27FC236}">
+                <a16:creationId xmlns:a16="http://schemas.microsoft.com/office/drawing/2014/main" id="{4EB0E8E5-71F4-400F-BF76-0D3E2803F08B}"/>
+              </a:ext>
+            </a:extLst>
+          </p:cNvPr>
+          <p:cNvPicPr>
+            <a:picLocks noChangeAspect="1"/>
+          </p:cNvPicPr>
+          <p:nvPr/>
+        </p:nvPicPr>
+        <p:blipFill>
+          <a:blip r:embed="rId2">
+            <a:extLst>
+              <a:ext uri="{28A0092B-C50C-407E-A947-70E740481C1C}">
+                <a14:useLocalDpi xmlns:a14="http://schemas.microsoft.com/office/drawing/2010/main" val="0"/>
+              </a:ext>
+              <a:ext uri="{96DAC541-7B7A-43D3-8B79-37D633B846F1}">
+                <asvg:svgBlip xmlns:asvg="http://schemas.microsoft.com/office/drawing/2016/SVG/main" r:embed="rId3"/>
+              </a:ext>
+            </a:extLst>
+          </a:blip>
+          <a:stretch>
+            <a:fillRect/>
+          </a:stretch>
+        </p:blipFill>
+        <p:spPr>
+          <a:xfrm>
+            <a:off x="2740152" y="1600200"/>
+            <a:ext cx="6705600" cy="5029200"/>
+          </a:xfrm>
+          <a:prstGeom prst="rect">
+            <a:avLst/>
+          </a:prstGeom>
+        </p:spPr>
+      </p:pic>
+    </p:spTree>
+    <p:extLst>
+      <p:ext uri="{BB962C8B-B14F-4D97-AF65-F5344CB8AC3E}">
+        <p14:creationId xmlns:p14="http://schemas.microsoft.com/office/powerpoint/2010/main" val="1877921158"/>
+      </p:ext>
+    </p:extLst>
+  </p:cSld>
+  <p:clrMapOvr>
+    <a:masterClrMapping/>
+  </p:clrMapOvr>
+</p:sld>
+</file>
+
+<file path=ppt/slides/slide7.xml><?xml version="1.0" encoding="utf-8"?>
+<p:sld xmlns:a="http://schemas.openxmlformats.org/drawingml/2006/main" xmlns:r="http://schemas.openxmlformats.org/officeDocument/2006/relationships" xmlns:p="http://schemas.openxmlformats.org/presentationml/2006/main">
+  <p:cSld>
+    <p:bg>
+      <p:bgPr>
+        <a:solidFill>
+          <a:schemeClr val="bg1"/>
+        </a:solidFill>
+        <a:effectLst/>
+      </p:bgPr>
+    </p:bg>
+    <p:spTree>
+      <p:nvGrpSpPr>
+        <p:cNvPr id="1" name=""/>
+        <p:cNvGrpSpPr/>
+        <p:nvPr/>
+      </p:nvGrpSpPr>
+      <p:grpSpPr>
+        <a:xfrm>
+          <a:off x="0" y="0"/>
+          <a:ext cx="0" cy="0"/>
+          <a:chOff x="0" y="0"/>
+          <a:chExt cx="0" cy="0"/>
+        </a:xfrm>
+      </p:grpSpPr>
+      <p:sp>
+        <p:nvSpPr>
+          <p:cNvPr id="16" name="Rectangle 15">
+            <a:extLst>
+              <a:ext uri="{FF2B5EF4-FFF2-40B4-BE49-F238E27FC236}">
+                <a16:creationId xmlns:a16="http://schemas.microsoft.com/office/drawing/2014/main" id="{A4AC5506-6312-4701-8D3C-40187889A947}"/>
+              </a:ext>
+              <a:ext uri="{C183D7F6-B498-43B3-948B-1728B52AA6E4}">
+                <adec:decorative xmlns:adec="http://schemas.microsoft.com/office/drawing/2017/decorative" val="1"/>
+              </a:ext>
+            </a:extLst>
+          </p:cNvPr>
+          <p:cNvSpPr>
+            <a:spLocks noGrp="1" noRot="1" noChangeAspect="1" noMove="1" noResize="1" noEditPoints="1" noAdjustHandles="1" noChangeArrowheads="1" noChangeShapeType="1" noTextEdit="1"/>
+          </p:cNvSpPr>
+          <p:nvPr>
+            <p:extLst>
+              <p:ext uri="{386F3935-93C4-4BCD-93E2-E3B085C9AB24}">
+                <p16:designElem xmlns:p16="http://schemas.microsoft.com/office/powerpoint/2015/main" val="1"/>
+              </p:ext>
+            </p:extLst>
+          </p:nvPr>
+        </p:nvSpPr>
+        <p:spPr>
+          <a:xfrm>
+            <a:off x="0" y="651752"/>
+            <a:ext cx="12192000" cy="736551"/>
+          </a:xfrm>
+          <a:prstGeom prst="rect">
+            <a:avLst/>
+          </a:prstGeom>
+          <a:solidFill>
+            <a:schemeClr val="tx1"/>
+          </a:solidFill>
+          <a:ln>
+            <a:noFill/>
+          </a:ln>
+        </p:spPr>
+        <p:style>
+          <a:lnRef idx="2">
+            <a:schemeClr val="accent1">
+              <a:shade val="50000"/>
+            </a:schemeClr>
+          </a:lnRef>
+          <a:fillRef idx="1">
+            <a:schemeClr val="accent1"/>
+          </a:fillRef>
+          <a:effectRef idx="0">
+            <a:schemeClr val="accent1"/>
+          </a:effectRef>
+          <a:fontRef idx="minor">
+            <a:schemeClr val="lt1"/>
+          </a:fontRef>
+        </p:style>
+        <p:txBody>
+          <a:bodyPr rtlCol="0" anchor="ctr"/>
+          <a:lstStyle/>
+          <a:p>
+            <a:pPr algn="ctr"/>
+            <a:endParaRPr lang="en-US"/>
+          </a:p>
+        </p:txBody>
+      </p:sp>
+      <p:sp>
+        <p:nvSpPr>
+          <p:cNvPr id="2" name="Title 1">
+            <a:extLst>
+              <a:ext uri="{FF2B5EF4-FFF2-40B4-BE49-F238E27FC236}">
+                <a16:creationId xmlns:a16="http://schemas.microsoft.com/office/drawing/2014/main" id="{7ED8D95F-23B4-4986-B699-1E67C2E8C522}"/>
+              </a:ext>
+            </a:extLst>
+          </p:cNvPr>
+          <p:cNvSpPr>
+            <a:spLocks noGrp="1"/>
+          </p:cNvSpPr>
+          <p:nvPr>
+            <p:ph type="title"/>
+          </p:nvPr>
+        </p:nvSpPr>
+        <p:spPr>
+          <a:xfrm>
+            <a:off x="556532" y="643467"/>
+            <a:ext cx="11210925" cy="744836"/>
+          </a:xfrm>
+        </p:spPr>
+        <p:txBody>
+          <a:bodyPr vert="horz" lIns="91440" tIns="45720" rIns="91440" bIns="45720" rtlCol="0" anchor="ctr">
+            <a:normAutofit/>
+          </a:bodyPr>
+          <a:lstStyle/>
+          <a:p>
+            <a:pPr algn="ctr"/>
+            <a:r>
+              <a:rPr lang="en-US" sz="3200" dirty="0">
+                <a:solidFill>
+                  <a:schemeClr val="bg1"/>
+                </a:solidFill>
+              </a:rPr>
+              <a:t>Latest year available for poverty Indicators:</a:t>
+            </a:r>
+            <a:endParaRPr lang="en-US" sz="3200" kern="1200" dirty="0">
+              <a:solidFill>
+                <a:schemeClr val="bg1"/>
+              </a:solidFill>
+              <a:latin typeface="+mj-lt"/>
+              <a:ea typeface="+mj-ea"/>
+              <a:cs typeface="+mj-cs"/>
+            </a:endParaRPr>
+          </a:p>
+        </p:txBody>
+      </p:sp>
+      <p:pic>
+        <p:nvPicPr>
+          <p:cNvPr id="4" name="Graphic 3">
+            <a:extLst>
+              <a:ext uri="{FF2B5EF4-FFF2-40B4-BE49-F238E27FC236}">
+                <a16:creationId xmlns:a16="http://schemas.microsoft.com/office/drawing/2014/main" id="{DF3CFB0A-3902-46B1-A8B3-EB96F6965AE2}"/>
+              </a:ext>
+            </a:extLst>
+          </p:cNvPr>
+          <p:cNvPicPr>
+            <a:picLocks noChangeAspect="1"/>
+          </p:cNvPicPr>
+          <p:nvPr/>
+        </p:nvPicPr>
+        <p:blipFill>
+          <a:blip r:embed="rId2">
+            <a:extLst>
+              <a:ext uri="{28A0092B-C50C-407E-A947-70E740481C1C}">
+                <a14:useLocalDpi xmlns:a14="http://schemas.microsoft.com/office/drawing/2010/main" val="0"/>
+              </a:ext>
+              <a:ext uri="{96DAC541-7B7A-43D3-8B79-37D633B846F1}">
+                <asvg:svgBlip xmlns:asvg="http://schemas.microsoft.com/office/drawing/2016/SVG/main" r:embed="rId3"/>
+              </a:ext>
+            </a:extLst>
+          </a:blip>
+          <a:stretch>
+            <a:fillRect/>
+          </a:stretch>
+        </p:blipFill>
+        <p:spPr>
+          <a:xfrm>
+            <a:off x="2740152" y="1600200"/>
+            <a:ext cx="6705600" cy="5029200"/>
+          </a:xfrm>
+          <a:prstGeom prst="rect">
+            <a:avLst/>
+          </a:prstGeom>
+        </p:spPr>
+      </p:pic>
+    </p:spTree>
+    <p:extLst>
+      <p:ext uri="{BB962C8B-B14F-4D97-AF65-F5344CB8AC3E}">
+        <p14:creationId xmlns:p14="http://schemas.microsoft.com/office/powerpoint/2010/main" val="1405631737"/>
+      </p:ext>
+    </p:extLst>
+  </p:cSld>
+  <p:clrMapOvr>
+    <a:masterClrMapping/>
+  </p:clrMapOvr>
+</p:sld>
+</file>
+
+<file path=ppt/slides/slide8.xml><?xml version="1.0" encoding="utf-8"?>
+<p:sld xmlns:a="http://schemas.openxmlformats.org/drawingml/2006/main" xmlns:r="http://schemas.openxmlformats.org/officeDocument/2006/relationships" xmlns:p="http://schemas.openxmlformats.org/presentationml/2006/main">
+  <p:cSld>
+    <p:bg>
+      <p:bgPr>
+        <a:solidFill>
+          <a:schemeClr val="bg1"/>
+        </a:solidFill>
+        <a:effectLst/>
+      </p:bgPr>
+    </p:bg>
+    <p:spTree>
+      <p:nvGrpSpPr>
+        <p:cNvPr id="1" name=""/>
+        <p:cNvGrpSpPr/>
+        <p:nvPr/>
+      </p:nvGrpSpPr>
+      <p:grpSpPr>
+        <a:xfrm>
+          <a:off x="0" y="0"/>
+          <a:ext cx="0" cy="0"/>
+          <a:chOff x="0" y="0"/>
+          <a:chExt cx="0" cy="0"/>
+        </a:xfrm>
+      </p:grpSpPr>
+      <p:sp>
+        <p:nvSpPr>
+          <p:cNvPr id="16" name="Rectangle 15">
+            <a:extLst>
+              <a:ext uri="{FF2B5EF4-FFF2-40B4-BE49-F238E27FC236}">
+                <a16:creationId xmlns:a16="http://schemas.microsoft.com/office/drawing/2014/main" id="{A4AC5506-6312-4701-8D3C-40187889A947}"/>
+              </a:ext>
+              <a:ext uri="{C183D7F6-B498-43B3-948B-1728B52AA6E4}">
+                <adec:decorative xmlns:adec="http://schemas.microsoft.com/office/drawing/2017/decorative" val="1"/>
+              </a:ext>
+            </a:extLst>
+          </p:cNvPr>
+          <p:cNvSpPr>
+            <a:spLocks noGrp="1" noRot="1" noChangeAspect="1" noMove="1" noResize="1" noEditPoints="1" noAdjustHandles="1" noChangeArrowheads="1" noChangeShapeType="1" noTextEdit="1"/>
+          </p:cNvSpPr>
+          <p:nvPr>
+            <p:extLst>
+              <p:ext uri="{386F3935-93C4-4BCD-93E2-E3B085C9AB24}">
+                <p16:designElem xmlns:p16="http://schemas.microsoft.com/office/powerpoint/2015/main" val="1"/>
+              </p:ext>
+            </p:extLst>
+          </p:nvPr>
+        </p:nvSpPr>
+        <p:spPr>
+          <a:xfrm>
+            <a:off x="0" y="651752"/>
+            <a:ext cx="12192000" cy="736551"/>
+          </a:xfrm>
+          <a:prstGeom prst="rect">
+            <a:avLst/>
+          </a:prstGeom>
+          <a:solidFill>
+            <a:schemeClr val="tx1"/>
+          </a:solidFill>
+          <a:ln>
+            <a:noFill/>
+          </a:ln>
+        </p:spPr>
+        <p:style>
+          <a:lnRef idx="2">
+            <a:schemeClr val="accent1">
+              <a:shade val="50000"/>
+            </a:schemeClr>
+          </a:lnRef>
+          <a:fillRef idx="1">
+            <a:schemeClr val="accent1"/>
+          </a:fillRef>
+          <a:effectRef idx="0">
+            <a:schemeClr val="accent1"/>
+          </a:effectRef>
+          <a:fontRef idx="minor">
+            <a:schemeClr val="lt1"/>
+          </a:fontRef>
+        </p:style>
+        <p:txBody>
+          <a:bodyPr rtlCol="0" anchor="ctr"/>
+          <a:lstStyle/>
+          <a:p>
+            <a:pPr algn="ctr"/>
+            <a:endParaRPr lang="en-US"/>
+          </a:p>
+        </p:txBody>
+      </p:sp>
+      <p:sp>
+        <p:nvSpPr>
+          <p:cNvPr id="2" name="Title 1">
+            <a:extLst>
+              <a:ext uri="{FF2B5EF4-FFF2-40B4-BE49-F238E27FC236}">
+                <a16:creationId xmlns:a16="http://schemas.microsoft.com/office/drawing/2014/main" id="{7ED8D95F-23B4-4986-B699-1E67C2E8C522}"/>
+              </a:ext>
+            </a:extLst>
+          </p:cNvPr>
+          <p:cNvSpPr>
+            <a:spLocks noGrp="1"/>
+          </p:cNvSpPr>
+          <p:nvPr>
+            <p:ph type="title"/>
+          </p:nvPr>
+        </p:nvSpPr>
+        <p:spPr>
+          <a:xfrm>
+            <a:off x="556532" y="643467"/>
+            <a:ext cx="11210925" cy="744836"/>
+          </a:xfrm>
+        </p:spPr>
+        <p:txBody>
+          <a:bodyPr vert="horz" lIns="91440" tIns="45720" rIns="91440" bIns="45720" rtlCol="0" anchor="ctr">
+            <a:normAutofit/>
+          </a:bodyPr>
+          <a:lstStyle/>
+          <a:p>
+            <a:pPr algn="ctr"/>
+            <a:r>
+              <a:rPr lang="en-US" sz="3200" dirty="0">
+                <a:solidFill>
+                  <a:schemeClr val="bg1"/>
+                </a:solidFill>
+              </a:rPr>
+              <a:t>Latest year available for poverty Indicators:</a:t>
+            </a:r>
+            <a:endParaRPr lang="en-US" sz="3200" kern="1200" dirty="0">
+              <a:solidFill>
+                <a:schemeClr val="bg1"/>
+              </a:solidFill>
+              <a:latin typeface="+mj-lt"/>
+              <a:ea typeface="+mj-ea"/>
+              <a:cs typeface="+mj-cs"/>
+            </a:endParaRPr>
+          </a:p>
+        </p:txBody>
+      </p:sp>
+      <p:pic>
+        <p:nvPicPr>
+          <p:cNvPr id="4" name="Graphic 3">
+            <a:extLst>
+              <a:ext uri="{FF2B5EF4-FFF2-40B4-BE49-F238E27FC236}">
+                <a16:creationId xmlns:a16="http://schemas.microsoft.com/office/drawing/2014/main" id="{6B3DE265-E987-4709-A7FC-1DF8930C702A}"/>
+              </a:ext>
+            </a:extLst>
+          </p:cNvPr>
+          <p:cNvPicPr>
+            <a:picLocks noChangeAspect="1"/>
+          </p:cNvPicPr>
+          <p:nvPr/>
+        </p:nvPicPr>
+        <p:blipFill>
+          <a:blip r:embed="rId2">
+            <a:extLst>
+              <a:ext uri="{28A0092B-C50C-407E-A947-70E740481C1C}">
+                <a14:useLocalDpi xmlns:a14="http://schemas.microsoft.com/office/drawing/2010/main" val="0"/>
+              </a:ext>
+              <a:ext uri="{96DAC541-7B7A-43D3-8B79-37D633B846F1}">
+                <asvg:svgBlip xmlns:asvg="http://schemas.microsoft.com/office/drawing/2016/SVG/main" r:embed="rId3"/>
+              </a:ext>
+            </a:extLst>
+          </a:blip>
+          <a:stretch>
+            <a:fillRect/>
+          </a:stretch>
+        </p:blipFill>
+        <p:spPr>
+          <a:xfrm>
+            <a:off x="2740152" y="1600200"/>
+            <a:ext cx="6705600" cy="5029200"/>
+          </a:xfrm>
+          <a:prstGeom prst="rect">
+            <a:avLst/>
+          </a:prstGeom>
+        </p:spPr>
+      </p:pic>
+    </p:spTree>
+    <p:extLst>
+      <p:ext uri="{BB962C8B-B14F-4D97-AF65-F5344CB8AC3E}">
+        <p14:creationId xmlns:p14="http://schemas.microsoft.com/office/powerpoint/2010/main" val="471415155"/>
+      </p:ext>
+    </p:extLst>
+  </p:cSld>
+  <p:clrMapOvr>
+    <a:masterClrMapping/>
+  </p:clrMapOvr>
+</p:sld>
+</file>
+
+<file path=ppt/slides/slide9.xml><?xml version="1.0" encoding="utf-8"?>
+<p:sld xmlns:a="http://schemas.openxmlformats.org/drawingml/2006/main" xmlns:r="http://schemas.openxmlformats.org/officeDocument/2006/relationships" xmlns:p="http://schemas.openxmlformats.org/presentationml/2006/main">
+  <p:cSld>
+    <p:bg>
+      <p:bgPr>
+        <a:solidFill>
+          <a:schemeClr val="bg1"/>
+        </a:solidFill>
+        <a:effectLst/>
+      </p:bgPr>
+    </p:bg>
+    <p:spTree>
+      <p:nvGrpSpPr>
+        <p:cNvPr id="1" name=""/>
+        <p:cNvGrpSpPr/>
+        <p:nvPr/>
+      </p:nvGrpSpPr>
+      <p:grpSpPr>
+        <a:xfrm>
+          <a:off x="0" y="0"/>
+          <a:ext cx="0" cy="0"/>
+          <a:chOff x="0" y="0"/>
+          <a:chExt cx="0" cy="0"/>
+        </a:xfrm>
+      </p:grpSpPr>
+      <p:sp>
+        <p:nvSpPr>
+          <p:cNvPr id="16" name="Rectangle 15">
+            <a:extLst>
+              <a:ext uri="{FF2B5EF4-FFF2-40B4-BE49-F238E27FC236}">
+                <a16:creationId xmlns:a16="http://schemas.microsoft.com/office/drawing/2014/main" id="{A4AC5506-6312-4701-8D3C-40187889A947}"/>
+              </a:ext>
+              <a:ext uri="{C183D7F6-B498-43B3-948B-1728B52AA6E4}">
+                <adec:decorative xmlns:adec="http://schemas.microsoft.com/office/drawing/2017/decorative" val="1"/>
+              </a:ext>
+            </a:extLst>
+          </p:cNvPr>
+          <p:cNvSpPr>
+            <a:spLocks noGrp="1" noRot="1" noChangeAspect="1" noMove="1" noResize="1" noEditPoints="1" noAdjustHandles="1" noChangeArrowheads="1" noChangeShapeType="1" noTextEdit="1"/>
+          </p:cNvSpPr>
+          <p:nvPr>
+            <p:extLst>
+              <p:ext uri="{386F3935-93C4-4BCD-93E2-E3B085C9AB24}">
+                <p16:designElem xmlns:p16="http://schemas.microsoft.com/office/powerpoint/2015/main" val="1"/>
+              </p:ext>
+            </p:extLst>
+          </p:nvPr>
+        </p:nvSpPr>
+        <p:spPr>
+          <a:xfrm>
+            <a:off x="0" y="651752"/>
+            <a:ext cx="12192000" cy="736551"/>
+          </a:xfrm>
+          <a:prstGeom prst="rect">
+            <a:avLst/>
+          </a:prstGeom>
+          <a:solidFill>
+            <a:schemeClr val="tx1"/>
+          </a:solidFill>
+          <a:ln>
+            <a:noFill/>
+          </a:ln>
+        </p:spPr>
+        <p:style>
+          <a:lnRef idx="2">
+            <a:schemeClr val="accent1">
+              <a:shade val="50000"/>
+            </a:schemeClr>
+          </a:lnRef>
+          <a:fillRef idx="1">
+            <a:schemeClr val="accent1"/>
+          </a:fillRef>
+          <a:effectRef idx="0">
+            <a:schemeClr val="accent1"/>
+          </a:effectRef>
+          <a:fontRef idx="minor">
+            <a:schemeClr val="lt1"/>
+          </a:fontRef>
+        </p:style>
+        <p:txBody>
+          <a:bodyPr rtlCol="0" anchor="ctr"/>
+          <a:lstStyle/>
+          <a:p>
+            <a:pPr algn="ctr"/>
+            <a:endParaRPr lang="en-US"/>
+          </a:p>
+        </p:txBody>
+      </p:sp>
+      <p:sp>
+        <p:nvSpPr>
+          <p:cNvPr id="2" name="Title 1">
+            <a:extLst>
+              <a:ext uri="{FF2B5EF4-FFF2-40B4-BE49-F238E27FC236}">
+                <a16:creationId xmlns:a16="http://schemas.microsoft.com/office/drawing/2014/main" id="{7ED8D95F-23B4-4986-B699-1E67C2E8C522}"/>
+              </a:ext>
+            </a:extLst>
+          </p:cNvPr>
+          <p:cNvSpPr>
+            <a:spLocks noGrp="1"/>
+          </p:cNvSpPr>
+          <p:nvPr>
+            <p:ph type="title"/>
+          </p:nvPr>
+        </p:nvSpPr>
+        <p:spPr>
+          <a:xfrm>
+            <a:off x="556532" y="643467"/>
+            <a:ext cx="11210925" cy="744836"/>
+          </a:xfrm>
+        </p:spPr>
+        <p:txBody>
+          <a:bodyPr vert="horz" lIns="91440" tIns="45720" rIns="91440" bIns="45720" rtlCol="0" anchor="ctr">
+            <a:normAutofit/>
+          </a:bodyPr>
+          <a:lstStyle/>
+          <a:p>
+            <a:pPr algn="ctr"/>
+            <a:r>
+              <a:rPr lang="en-US" sz="3200" dirty="0">
+                <a:solidFill>
+                  <a:schemeClr val="bg1"/>
+                </a:solidFill>
+              </a:rPr>
+              <a:t>Latest year available for poverty Indicators:</a:t>
+            </a:r>
+            <a:endParaRPr lang="en-US" sz="3200" kern="1200" dirty="0">
+              <a:solidFill>
+                <a:schemeClr val="bg1"/>
+              </a:solidFill>
+              <a:latin typeface="+mj-lt"/>
+              <a:ea typeface="+mj-ea"/>
+              <a:cs typeface="+mj-cs"/>
+            </a:endParaRPr>
+          </a:p>
+        </p:txBody>
+      </p:sp>
+      <p:pic>
+        <p:nvPicPr>
+          <p:cNvPr id="4" name="Graphic 3">
+            <a:extLst>
+              <a:ext uri="{FF2B5EF4-FFF2-40B4-BE49-F238E27FC236}">
+                <a16:creationId xmlns:a16="http://schemas.microsoft.com/office/drawing/2014/main" id="{F1CB1F44-68F5-4D03-A621-F253B2E1B353}"/>
+              </a:ext>
+            </a:extLst>
+          </p:cNvPr>
+          <p:cNvPicPr>
+            <a:picLocks noChangeAspect="1"/>
+          </p:cNvPicPr>
+          <p:nvPr/>
+        </p:nvPicPr>
+        <p:blipFill>
+          <a:blip r:embed="rId2">
+            <a:extLst>
+              <a:ext uri="{28A0092B-C50C-407E-A947-70E740481C1C}">
+                <a14:useLocalDpi xmlns:a14="http://schemas.microsoft.com/office/drawing/2010/main" val="0"/>
+              </a:ext>
+              <a:ext uri="{96DAC541-7B7A-43D3-8B79-37D633B846F1}">
+                <asvg:svgBlip xmlns:asvg="http://schemas.microsoft.com/office/drawing/2016/SVG/main" r:embed="rId3"/>
+              </a:ext>
+            </a:extLst>
+          </a:blip>
+          <a:stretch>
+            <a:fillRect/>
+          </a:stretch>
+        </p:blipFill>
+        <p:spPr>
+          <a:xfrm>
+            <a:off x="2740152" y="1600200"/>
+            <a:ext cx="6705600" cy="5029200"/>
+          </a:xfrm>
+          <a:prstGeom prst="rect">
+            <a:avLst/>
+          </a:prstGeom>
+        </p:spPr>
+      </p:pic>
+    </p:spTree>
+    <p:extLst>
+      <p:ext uri="{BB962C8B-B14F-4D97-AF65-F5344CB8AC3E}">
+        <p14:creationId xmlns:p14="http://schemas.microsoft.com/office/powerpoint/2010/main" val="3535226098"/>
       </p:ext>
     </p:extLst>
   </p:cSld>

</xml_diff>